<commit_message>
início da criação de novos slides
</commit_message>
<xml_diff>
--- a/React.pptx
+++ b/React.pptx
@@ -5,7 +5,7 @@
     <p:sldMasterId id="2147483648" r:id="rId1"/>
   </p:sldMasterIdLst>
   <p:notesMasterIdLst>
-    <p:notesMasterId r:id="rId9"/>
+    <p:notesMasterId r:id="rId13"/>
   </p:notesMasterIdLst>
   <p:sldIdLst>
     <p:sldId id="256" r:id="rId2"/>
@@ -14,7 +14,11 @@
     <p:sldId id="311" r:id="rId5"/>
     <p:sldId id="310" r:id="rId6"/>
     <p:sldId id="309" r:id="rId7"/>
-    <p:sldId id="306" r:id="rId8"/>
+    <p:sldId id="315" r:id="rId8"/>
+    <p:sldId id="312" r:id="rId9"/>
+    <p:sldId id="313" r:id="rId10"/>
+    <p:sldId id="314" r:id="rId11"/>
+    <p:sldId id="306" r:id="rId12"/>
   </p:sldIdLst>
   <p:sldSz cx="12192000" cy="6858000"/>
   <p:notesSz cx="6858000" cy="9144000"/>
@@ -203,7 +207,7 @@
           <a:p>
             <a:fld id="{94D3EB41-CF60-4C9F-BD83-AE56FA0945EB}" type="datetimeFigureOut">
               <a:rPr lang="pt-BR" smtClean="0"/>
-              <a:t>02/09/2020</a:t>
+              <a:t>03/09/2020</a:t>
             </a:fld>
             <a:endParaRPr lang="pt-BR"/>
           </a:p>
@@ -554,6 +558,174 @@
 </p:notes>
 </file>
 
+<file path=ppt/notesSlides/notesSlide10.xml><?xml version="1.0" encoding="utf-8"?>
+<p:notes xmlns:a="http://schemas.openxmlformats.org/drawingml/2006/main" xmlns:r="http://schemas.openxmlformats.org/officeDocument/2006/relationships" xmlns:p="http://schemas.openxmlformats.org/presentationml/2006/main">
+  <p:cSld>
+    <p:spTree>
+      <p:nvGrpSpPr>
+        <p:cNvPr id="1" name=""/>
+        <p:cNvGrpSpPr/>
+        <p:nvPr/>
+      </p:nvGrpSpPr>
+      <p:grpSpPr>
+        <a:xfrm>
+          <a:off x="0" y="0"/>
+          <a:ext cx="0" cy="0"/>
+          <a:chOff x="0" y="0"/>
+          <a:chExt cx="0" cy="0"/>
+        </a:xfrm>
+      </p:grpSpPr>
+      <p:sp>
+        <p:nvSpPr>
+          <p:cNvPr id="2" name="Slide Image Placeholder 1"/>
+          <p:cNvSpPr>
+            <a:spLocks noGrp="1" noRot="1" noChangeAspect="1"/>
+          </p:cNvSpPr>
+          <p:nvPr>
+            <p:ph type="sldImg"/>
+          </p:nvPr>
+        </p:nvSpPr>
+        <p:spPr/>
+      </p:sp>
+      <p:sp>
+        <p:nvSpPr>
+          <p:cNvPr id="3" name="Notes Placeholder 2"/>
+          <p:cNvSpPr>
+            <a:spLocks noGrp="1"/>
+          </p:cNvSpPr>
+          <p:nvPr>
+            <p:ph type="body" idx="1"/>
+          </p:nvPr>
+        </p:nvSpPr>
+        <p:spPr/>
+        <p:txBody>
+          <a:bodyPr/>
+          <a:lstStyle/>
+          <a:p>
+            <a:endParaRPr lang="en-US" dirty="0"/>
+          </a:p>
+        </p:txBody>
+      </p:sp>
+      <p:sp>
+        <p:nvSpPr>
+          <p:cNvPr id="4" name="Slide Number Placeholder 3"/>
+          <p:cNvSpPr>
+            <a:spLocks noGrp="1"/>
+          </p:cNvSpPr>
+          <p:nvPr>
+            <p:ph type="sldNum" sz="quarter" idx="5"/>
+          </p:nvPr>
+        </p:nvSpPr>
+        <p:spPr/>
+        <p:txBody>
+          <a:bodyPr/>
+          <a:lstStyle/>
+          <a:p>
+            <a:fld id="{020F486D-935E-4125-8FD7-C735663CC7DE}" type="slidenum">
+              <a:rPr lang="pt-BR" smtClean="0"/>
+              <a:t>10</a:t>
+            </a:fld>
+            <a:endParaRPr lang="pt-BR"/>
+          </a:p>
+        </p:txBody>
+      </p:sp>
+    </p:spTree>
+    <p:extLst>
+      <p:ext uri="{BB962C8B-B14F-4D97-AF65-F5344CB8AC3E}">
+        <p14:creationId xmlns:p14="http://schemas.microsoft.com/office/powerpoint/2010/main" val="1288282786"/>
+      </p:ext>
+    </p:extLst>
+  </p:cSld>
+  <p:clrMapOvr>
+    <a:masterClrMapping/>
+  </p:clrMapOvr>
+</p:notes>
+</file>
+
+<file path=ppt/notesSlides/notesSlide11.xml><?xml version="1.0" encoding="utf-8"?>
+<p:notes xmlns:a="http://schemas.openxmlformats.org/drawingml/2006/main" xmlns:r="http://schemas.openxmlformats.org/officeDocument/2006/relationships" xmlns:p="http://schemas.openxmlformats.org/presentationml/2006/main">
+  <p:cSld>
+    <p:spTree>
+      <p:nvGrpSpPr>
+        <p:cNvPr id="1" name=""/>
+        <p:cNvGrpSpPr/>
+        <p:nvPr/>
+      </p:nvGrpSpPr>
+      <p:grpSpPr>
+        <a:xfrm>
+          <a:off x="0" y="0"/>
+          <a:ext cx="0" cy="0"/>
+          <a:chOff x="0" y="0"/>
+          <a:chExt cx="0" cy="0"/>
+        </a:xfrm>
+      </p:grpSpPr>
+      <p:sp>
+        <p:nvSpPr>
+          <p:cNvPr id="2" name="Slide Image Placeholder 1"/>
+          <p:cNvSpPr>
+            <a:spLocks noGrp="1" noRot="1" noChangeAspect="1"/>
+          </p:cNvSpPr>
+          <p:nvPr>
+            <p:ph type="sldImg"/>
+          </p:nvPr>
+        </p:nvSpPr>
+        <p:spPr/>
+      </p:sp>
+      <p:sp>
+        <p:nvSpPr>
+          <p:cNvPr id="3" name="Notes Placeholder 2"/>
+          <p:cNvSpPr>
+            <a:spLocks noGrp="1"/>
+          </p:cNvSpPr>
+          <p:nvPr>
+            <p:ph type="body" idx="1"/>
+          </p:nvPr>
+        </p:nvSpPr>
+        <p:spPr/>
+        <p:txBody>
+          <a:bodyPr/>
+          <a:lstStyle/>
+          <a:p>
+            <a:endParaRPr lang="en-US" dirty="0"/>
+          </a:p>
+        </p:txBody>
+      </p:sp>
+      <p:sp>
+        <p:nvSpPr>
+          <p:cNvPr id="4" name="Slide Number Placeholder 3"/>
+          <p:cNvSpPr>
+            <a:spLocks noGrp="1"/>
+          </p:cNvSpPr>
+          <p:nvPr>
+            <p:ph type="sldNum" sz="quarter" idx="5"/>
+          </p:nvPr>
+        </p:nvSpPr>
+        <p:spPr/>
+        <p:txBody>
+          <a:bodyPr/>
+          <a:lstStyle/>
+          <a:p>
+            <a:fld id="{020F486D-935E-4125-8FD7-C735663CC7DE}" type="slidenum">
+              <a:rPr lang="pt-BR" smtClean="0"/>
+              <a:t>11</a:t>
+            </a:fld>
+            <a:endParaRPr lang="pt-BR"/>
+          </a:p>
+        </p:txBody>
+      </p:sp>
+    </p:spTree>
+    <p:extLst>
+      <p:ext uri="{BB962C8B-B14F-4D97-AF65-F5344CB8AC3E}">
+        <p14:creationId xmlns:p14="http://schemas.microsoft.com/office/powerpoint/2010/main" val="639577057"/>
+      </p:ext>
+    </p:extLst>
+  </p:cSld>
+  <p:clrMapOvr>
+    <a:masterClrMapping/>
+  </p:clrMapOvr>
+</p:notes>
+</file>
+
 <file path=ppt/notesSlides/notesSlide2.xml><?xml version="1.0" encoding="utf-8"?>
 <p:notes xmlns:a="http://schemas.openxmlformats.org/drawingml/2006/main" xmlns:r="http://schemas.openxmlformats.org/officeDocument/2006/relationships" xmlns:p="http://schemas.openxmlformats.org/presentationml/2006/main">
   <p:cSld>
@@ -1048,7 +1220,175 @@
     </p:spTree>
     <p:extLst>
       <p:ext uri="{BB962C8B-B14F-4D97-AF65-F5344CB8AC3E}">
-        <p14:creationId xmlns:p14="http://schemas.microsoft.com/office/powerpoint/2010/main" val="639577057"/>
+        <p14:creationId xmlns:p14="http://schemas.microsoft.com/office/powerpoint/2010/main" val="3245192028"/>
+      </p:ext>
+    </p:extLst>
+  </p:cSld>
+  <p:clrMapOvr>
+    <a:masterClrMapping/>
+  </p:clrMapOvr>
+</p:notes>
+</file>
+
+<file path=ppt/notesSlides/notesSlide8.xml><?xml version="1.0" encoding="utf-8"?>
+<p:notes xmlns:a="http://schemas.openxmlformats.org/drawingml/2006/main" xmlns:r="http://schemas.openxmlformats.org/officeDocument/2006/relationships" xmlns:p="http://schemas.openxmlformats.org/presentationml/2006/main">
+  <p:cSld>
+    <p:spTree>
+      <p:nvGrpSpPr>
+        <p:cNvPr id="1" name=""/>
+        <p:cNvGrpSpPr/>
+        <p:nvPr/>
+      </p:nvGrpSpPr>
+      <p:grpSpPr>
+        <a:xfrm>
+          <a:off x="0" y="0"/>
+          <a:ext cx="0" cy="0"/>
+          <a:chOff x="0" y="0"/>
+          <a:chExt cx="0" cy="0"/>
+        </a:xfrm>
+      </p:grpSpPr>
+      <p:sp>
+        <p:nvSpPr>
+          <p:cNvPr id="2" name="Slide Image Placeholder 1"/>
+          <p:cNvSpPr>
+            <a:spLocks noGrp="1" noRot="1" noChangeAspect="1"/>
+          </p:cNvSpPr>
+          <p:nvPr>
+            <p:ph type="sldImg"/>
+          </p:nvPr>
+        </p:nvSpPr>
+        <p:spPr/>
+      </p:sp>
+      <p:sp>
+        <p:nvSpPr>
+          <p:cNvPr id="3" name="Notes Placeholder 2"/>
+          <p:cNvSpPr>
+            <a:spLocks noGrp="1"/>
+          </p:cNvSpPr>
+          <p:nvPr>
+            <p:ph type="body" idx="1"/>
+          </p:nvPr>
+        </p:nvSpPr>
+        <p:spPr/>
+        <p:txBody>
+          <a:bodyPr/>
+          <a:lstStyle/>
+          <a:p>
+            <a:endParaRPr lang="en-US" dirty="0"/>
+          </a:p>
+        </p:txBody>
+      </p:sp>
+      <p:sp>
+        <p:nvSpPr>
+          <p:cNvPr id="4" name="Slide Number Placeholder 3"/>
+          <p:cNvSpPr>
+            <a:spLocks noGrp="1"/>
+          </p:cNvSpPr>
+          <p:nvPr>
+            <p:ph type="sldNum" sz="quarter" idx="5"/>
+          </p:nvPr>
+        </p:nvSpPr>
+        <p:spPr/>
+        <p:txBody>
+          <a:bodyPr/>
+          <a:lstStyle/>
+          <a:p>
+            <a:fld id="{020F486D-935E-4125-8FD7-C735663CC7DE}" type="slidenum">
+              <a:rPr lang="pt-BR" smtClean="0"/>
+              <a:t>8</a:t>
+            </a:fld>
+            <a:endParaRPr lang="pt-BR"/>
+          </a:p>
+        </p:txBody>
+      </p:sp>
+    </p:spTree>
+    <p:extLst>
+      <p:ext uri="{BB962C8B-B14F-4D97-AF65-F5344CB8AC3E}">
+        <p14:creationId xmlns:p14="http://schemas.microsoft.com/office/powerpoint/2010/main" val="2933779963"/>
+      </p:ext>
+    </p:extLst>
+  </p:cSld>
+  <p:clrMapOvr>
+    <a:masterClrMapping/>
+  </p:clrMapOvr>
+</p:notes>
+</file>
+
+<file path=ppt/notesSlides/notesSlide9.xml><?xml version="1.0" encoding="utf-8"?>
+<p:notes xmlns:a="http://schemas.openxmlformats.org/drawingml/2006/main" xmlns:r="http://schemas.openxmlformats.org/officeDocument/2006/relationships" xmlns:p="http://schemas.openxmlformats.org/presentationml/2006/main">
+  <p:cSld>
+    <p:spTree>
+      <p:nvGrpSpPr>
+        <p:cNvPr id="1" name=""/>
+        <p:cNvGrpSpPr/>
+        <p:nvPr/>
+      </p:nvGrpSpPr>
+      <p:grpSpPr>
+        <a:xfrm>
+          <a:off x="0" y="0"/>
+          <a:ext cx="0" cy="0"/>
+          <a:chOff x="0" y="0"/>
+          <a:chExt cx="0" cy="0"/>
+        </a:xfrm>
+      </p:grpSpPr>
+      <p:sp>
+        <p:nvSpPr>
+          <p:cNvPr id="2" name="Slide Image Placeholder 1"/>
+          <p:cNvSpPr>
+            <a:spLocks noGrp="1" noRot="1" noChangeAspect="1"/>
+          </p:cNvSpPr>
+          <p:nvPr>
+            <p:ph type="sldImg"/>
+          </p:nvPr>
+        </p:nvSpPr>
+        <p:spPr/>
+      </p:sp>
+      <p:sp>
+        <p:nvSpPr>
+          <p:cNvPr id="3" name="Notes Placeholder 2"/>
+          <p:cNvSpPr>
+            <a:spLocks noGrp="1"/>
+          </p:cNvSpPr>
+          <p:nvPr>
+            <p:ph type="body" idx="1"/>
+          </p:nvPr>
+        </p:nvSpPr>
+        <p:spPr/>
+        <p:txBody>
+          <a:bodyPr/>
+          <a:lstStyle/>
+          <a:p>
+            <a:endParaRPr lang="en-US" dirty="0"/>
+          </a:p>
+        </p:txBody>
+      </p:sp>
+      <p:sp>
+        <p:nvSpPr>
+          <p:cNvPr id="4" name="Slide Number Placeholder 3"/>
+          <p:cNvSpPr>
+            <a:spLocks noGrp="1"/>
+          </p:cNvSpPr>
+          <p:nvPr>
+            <p:ph type="sldNum" sz="quarter" idx="5"/>
+          </p:nvPr>
+        </p:nvSpPr>
+        <p:spPr/>
+        <p:txBody>
+          <a:bodyPr/>
+          <a:lstStyle/>
+          <a:p>
+            <a:fld id="{020F486D-935E-4125-8FD7-C735663CC7DE}" type="slidenum">
+              <a:rPr lang="pt-BR" smtClean="0"/>
+              <a:t>9</a:t>
+            </a:fld>
+            <a:endParaRPr lang="pt-BR"/>
+          </a:p>
+        </p:txBody>
+      </p:sp>
+    </p:spTree>
+    <p:extLst>
+      <p:ext uri="{BB962C8B-B14F-4D97-AF65-F5344CB8AC3E}">
+        <p14:creationId xmlns:p14="http://schemas.microsoft.com/office/powerpoint/2010/main" val="39980967"/>
       </p:ext>
     </p:extLst>
   </p:cSld>
@@ -1217,7 +1557,7 @@
           <a:p>
             <a:fld id="{9642BF85-54FF-46CE-B398-87F998CFD60B}" type="datetimeFigureOut">
               <a:rPr lang="pt-BR" smtClean="0"/>
-              <a:t>02/09/2020</a:t>
+              <a:t>03/09/2020</a:t>
             </a:fld>
             <a:endParaRPr lang="pt-BR"/>
           </a:p>
@@ -1385,7 +1725,7 @@
           <a:p>
             <a:fld id="{9642BF85-54FF-46CE-B398-87F998CFD60B}" type="datetimeFigureOut">
               <a:rPr lang="pt-BR" smtClean="0"/>
-              <a:t>02/09/2020</a:t>
+              <a:t>03/09/2020</a:t>
             </a:fld>
             <a:endParaRPr lang="pt-BR"/>
           </a:p>
@@ -1563,7 +1903,7 @@
           <a:p>
             <a:fld id="{9642BF85-54FF-46CE-B398-87F998CFD60B}" type="datetimeFigureOut">
               <a:rPr lang="pt-BR" smtClean="0"/>
-              <a:t>02/09/2020</a:t>
+              <a:t>03/09/2020</a:t>
             </a:fld>
             <a:endParaRPr lang="pt-BR"/>
           </a:p>
@@ -1900,7 +2240,7 @@
           <a:p>
             <a:fld id="{9642BF85-54FF-46CE-B398-87F998CFD60B}" type="datetimeFigureOut">
               <a:rPr lang="pt-BR" smtClean="0"/>
-              <a:t>02/09/2020</a:t>
+              <a:t>03/09/2020</a:t>
             </a:fld>
             <a:endParaRPr lang="pt-BR"/>
           </a:p>
@@ -2171,7 +2511,7 @@
           <a:p>
             <a:fld id="{9642BF85-54FF-46CE-B398-87F998CFD60B}" type="datetimeFigureOut">
               <a:rPr lang="pt-BR" smtClean="0"/>
-              <a:t>02/09/2020</a:t>
+              <a:t>03/09/2020</a:t>
             </a:fld>
             <a:endParaRPr lang="pt-BR"/>
           </a:p>
@@ -2417,7 +2757,7 @@
           <a:p>
             <a:fld id="{9642BF85-54FF-46CE-B398-87F998CFD60B}" type="datetimeFigureOut">
               <a:rPr lang="pt-BR" smtClean="0"/>
-              <a:t>02/09/2020</a:t>
+              <a:t>03/09/2020</a:t>
             </a:fld>
             <a:endParaRPr lang="pt-BR"/>
           </a:p>
@@ -2781,7 +3121,7 @@
           <a:p>
             <a:fld id="{9642BF85-54FF-46CE-B398-87F998CFD60B}" type="datetimeFigureOut">
               <a:rPr lang="pt-BR" smtClean="0"/>
-              <a:t>02/09/2020</a:t>
+              <a:t>03/09/2020</a:t>
             </a:fld>
             <a:endParaRPr lang="pt-BR"/>
           </a:p>
@@ -2915,7 +3255,7 @@
           <a:p>
             <a:fld id="{9642BF85-54FF-46CE-B398-87F998CFD60B}" type="datetimeFigureOut">
               <a:rPr lang="pt-BR" smtClean="0"/>
-              <a:t>02/09/2020</a:t>
+              <a:t>03/09/2020</a:t>
             </a:fld>
             <a:endParaRPr lang="pt-BR"/>
           </a:p>
@@ -3010,7 +3350,7 @@
           <a:p>
             <a:fld id="{9642BF85-54FF-46CE-B398-87F998CFD60B}" type="datetimeFigureOut">
               <a:rPr lang="pt-BR" smtClean="0"/>
-              <a:t>02/09/2020</a:t>
+              <a:t>03/09/2020</a:t>
             </a:fld>
             <a:endParaRPr lang="pt-BR"/>
           </a:p>
@@ -3285,7 +3625,7 @@
           <a:p>
             <a:fld id="{9642BF85-54FF-46CE-B398-87F998CFD60B}" type="datetimeFigureOut">
               <a:rPr lang="pt-BR" smtClean="0"/>
-              <a:t>02/09/2020</a:t>
+              <a:t>03/09/2020</a:t>
             </a:fld>
             <a:endParaRPr lang="pt-BR"/>
           </a:p>
@@ -3537,7 +3877,7 @@
           <a:p>
             <a:fld id="{9642BF85-54FF-46CE-B398-87F998CFD60B}" type="datetimeFigureOut">
               <a:rPr lang="pt-BR" smtClean="0"/>
-              <a:t>02/09/2020</a:t>
+              <a:t>03/09/2020</a:t>
             </a:fld>
             <a:endParaRPr lang="pt-BR"/>
           </a:p>
@@ -3757,7 +4097,7 @@
           <a:p>
             <a:fld id="{9642BF85-54FF-46CE-B398-87F998CFD60B}" type="datetimeFigureOut">
               <a:rPr lang="pt-BR" smtClean="0"/>
-              <a:t>02/09/2020</a:t>
+              <a:t>03/09/2020</a:t>
             </a:fld>
             <a:endParaRPr lang="pt-BR"/>
           </a:p>
@@ -4259,6 +4599,205 @@
 </p:sld>
 </file>
 
+<file path=ppt/slides/slide10.xml><?xml version="1.0" encoding="utf-8"?>
+<p:sld xmlns:a="http://schemas.openxmlformats.org/drawingml/2006/main" xmlns:r="http://schemas.openxmlformats.org/officeDocument/2006/relationships" xmlns:p="http://schemas.openxmlformats.org/presentationml/2006/main">
+  <p:cSld>
+    <p:spTree>
+      <p:nvGrpSpPr>
+        <p:cNvPr id="1" name=""/>
+        <p:cNvGrpSpPr/>
+        <p:nvPr/>
+      </p:nvGrpSpPr>
+      <p:grpSpPr>
+        <a:xfrm>
+          <a:off x="0" y="0"/>
+          <a:ext cx="0" cy="0"/>
+          <a:chOff x="0" y="0"/>
+          <a:chExt cx="0" cy="0"/>
+        </a:xfrm>
+      </p:grpSpPr>
+      <p:sp>
+        <p:nvSpPr>
+          <p:cNvPr id="5" name="Título 4"/>
+          <p:cNvSpPr>
+            <a:spLocks noGrp="1"/>
+          </p:cNvSpPr>
+          <p:nvPr>
+            <p:ph type="title"/>
+          </p:nvPr>
+        </p:nvSpPr>
+        <p:spPr/>
+        <p:txBody>
+          <a:bodyPr/>
+          <a:lstStyle/>
+          <a:p>
+            <a:r>
+              <a:rPr lang="pt-BR" dirty="0"/>
+              <a:t>Encapsulamento</a:t>
+            </a:r>
+          </a:p>
+        </p:txBody>
+      </p:sp>
+      <p:pic>
+        <p:nvPicPr>
+          <p:cNvPr id="3074" name="Picture 2" descr="Imagem representando a taxonomia de animais. Nele, uma hierarquia com a classe &quot;Animal&quot;, que é o primeiro nível da hierarquia, com as classes &quot;Mamífero&quot; e &quot;Ave&quot; que herdam de &quot;Animal&quot; e, no último nível, as classes &quot;Cachorro&quot; e &quot;Homem&quot; herdando de &quot;Mamífero&quot; e &quot;Beija-flor&quot; herdando de &quot;Ave&quot;. Imagem encontrada no Google Imagens.">
+            <a:extLst>
+              <a:ext uri="{FF2B5EF4-FFF2-40B4-BE49-F238E27FC236}">
+                <a16:creationId xmlns:a16="http://schemas.microsoft.com/office/drawing/2014/main" id="{9F4011FE-2B60-4987-9333-A4341C9837E1}"/>
+              </a:ext>
+            </a:extLst>
+          </p:cNvPr>
+          <p:cNvPicPr>
+            <a:picLocks noChangeAspect="1" noChangeArrowheads="1"/>
+          </p:cNvPicPr>
+          <p:nvPr/>
+        </p:nvPicPr>
+        <p:blipFill>
+          <a:blip r:embed="rId3">
+            <a:extLst>
+              <a:ext uri="{28A0092B-C50C-407E-A947-70E740481C1C}">
+                <a14:useLocalDpi xmlns:a14="http://schemas.microsoft.com/office/drawing/2010/main" val="0"/>
+              </a:ext>
+            </a:extLst>
+          </a:blip>
+          <a:srcRect/>
+          <a:stretch>
+            <a:fillRect/>
+          </a:stretch>
+        </p:blipFill>
+        <p:spPr bwMode="auto">
+          <a:xfrm>
+            <a:off x="2812619" y="1387928"/>
+            <a:ext cx="6566762" cy="4149233"/>
+          </a:xfrm>
+          <a:prstGeom prst="rect">
+            <a:avLst/>
+          </a:prstGeom>
+          <a:noFill/>
+          <a:extLst>
+            <a:ext uri="{909E8E84-426E-40DD-AFC4-6F175D3DCCD1}">
+              <a14:hiddenFill xmlns:a14="http://schemas.microsoft.com/office/drawing/2010/main">
+                <a:solidFill>
+                  <a:srgbClr val="FFFFFF"/>
+                </a:solidFill>
+              </a14:hiddenFill>
+            </a:ext>
+          </a:extLst>
+        </p:spPr>
+      </p:pic>
+    </p:spTree>
+    <p:extLst>
+      <p:ext uri="{BB962C8B-B14F-4D97-AF65-F5344CB8AC3E}">
+        <p14:creationId xmlns:p14="http://schemas.microsoft.com/office/powerpoint/2010/main" val="534452594"/>
+      </p:ext>
+    </p:extLst>
+  </p:cSld>
+  <p:clrMapOvr>
+    <a:masterClrMapping/>
+  </p:clrMapOvr>
+</p:sld>
+</file>
+
+<file path=ppt/slides/slide11.xml><?xml version="1.0" encoding="utf-8"?>
+<p:sld xmlns:a="http://schemas.openxmlformats.org/drawingml/2006/main" xmlns:r="http://schemas.openxmlformats.org/officeDocument/2006/relationships" xmlns:p="http://schemas.openxmlformats.org/presentationml/2006/main">
+  <p:cSld>
+    <p:spTree>
+      <p:nvGrpSpPr>
+        <p:cNvPr id="1" name=""/>
+        <p:cNvGrpSpPr/>
+        <p:nvPr/>
+      </p:nvGrpSpPr>
+      <p:grpSpPr>
+        <a:xfrm>
+          <a:off x="0" y="0"/>
+          <a:ext cx="0" cy="0"/>
+          <a:chOff x="0" y="0"/>
+          <a:chExt cx="0" cy="0"/>
+        </a:xfrm>
+      </p:grpSpPr>
+      <p:sp>
+        <p:nvSpPr>
+          <p:cNvPr id="5" name="Título 4"/>
+          <p:cNvSpPr>
+            <a:spLocks noGrp="1"/>
+          </p:cNvSpPr>
+          <p:nvPr>
+            <p:ph type="title"/>
+          </p:nvPr>
+        </p:nvSpPr>
+        <p:spPr/>
+        <p:txBody>
+          <a:bodyPr/>
+          <a:lstStyle/>
+          <a:p>
+            <a:r>
+              <a:rPr lang="pt-BR" dirty="0"/>
+              <a:t>Referências</a:t>
+            </a:r>
+          </a:p>
+        </p:txBody>
+      </p:sp>
+      <p:sp>
+        <p:nvSpPr>
+          <p:cNvPr id="6" name="Espaço Reservado para Conteúdo 5"/>
+          <p:cNvSpPr>
+            <a:spLocks noGrp="1"/>
+          </p:cNvSpPr>
+          <p:nvPr>
+            <p:ph idx="1"/>
+          </p:nvPr>
+        </p:nvSpPr>
+        <p:spPr/>
+        <p:txBody>
+          <a:bodyPr>
+            <a:normAutofit/>
+          </a:bodyPr>
+          <a:lstStyle/>
+          <a:p>
+            <a:pPr marL="514350" indent="-514350" algn="l">
+              <a:buFont typeface="+mj-lt"/>
+              <a:buAutoNum type="arabicPeriod"/>
+            </a:pPr>
+            <a:r>
+              <a:rPr lang="pt-BR" dirty="0">
+                <a:hlinkClick r:id="rId3"/>
+              </a:rPr>
+              <a:t>https://www.alura.com.br/artigos/poo-programacao-orientada-a-objetos</a:t>
+            </a:r>
+            <a:endParaRPr lang="pt-BR" dirty="0"/>
+          </a:p>
+          <a:p>
+            <a:pPr marL="514350" indent="-514350" algn="l">
+              <a:buFont typeface="+mj-lt"/>
+              <a:buAutoNum type="arabicPeriod"/>
+            </a:pPr>
+            <a:r>
+              <a:rPr lang="pt-BR" dirty="0"/>
+              <a:t>https://www.devmedia.com.br/os-4-pilares-da-programacao-orientada-a-objetos/9264</a:t>
+            </a:r>
+          </a:p>
+          <a:p>
+            <a:pPr marL="514350" indent="-514350" algn="l">
+              <a:buFont typeface="+mj-lt"/>
+              <a:buAutoNum type="arabicPeriod"/>
+            </a:pPr>
+            <a:endParaRPr lang="pt-BR" dirty="0"/>
+          </a:p>
+        </p:txBody>
+      </p:sp>
+    </p:spTree>
+    <p:extLst>
+      <p:ext uri="{BB962C8B-B14F-4D97-AF65-F5344CB8AC3E}">
+        <p14:creationId xmlns:p14="http://schemas.microsoft.com/office/powerpoint/2010/main" val="2484064327"/>
+      </p:ext>
+    </p:extLst>
+  </p:cSld>
+  <p:clrMapOvr>
+    <a:masterClrMapping/>
+  </p:clrMapOvr>
+</p:sld>
+</file>
+
 <file path=ppt/slides/slide2.xml><?xml version="1.0" encoding="utf-8"?>
 <p:sld xmlns:a="http://schemas.openxmlformats.org/drawingml/2006/main" xmlns:r="http://schemas.openxmlformats.org/officeDocument/2006/relationships" xmlns:p="http://schemas.openxmlformats.org/presentationml/2006/main">
   <p:cSld>
@@ -4846,7 +5385,7 @@
           <a:p>
             <a:r>
               <a:rPr lang="pt-BR" dirty="0"/>
-              <a:t>Referências</a:t>
+              <a:t>Programação orientada a objetos</a:t>
             </a:r>
           </a:p>
         </p:txBody>
@@ -4868,18 +5407,224 @@
           </a:bodyPr>
           <a:lstStyle/>
           <a:p>
-            <a:pPr marL="514350" indent="-514350" algn="l">
-              <a:buFont typeface="+mj-lt"/>
-              <a:buAutoNum type="arabicPeriod"/>
-            </a:pPr>
-            <a:endParaRPr lang="pt-BR" dirty="0"/>
+            <a:r>
+              <a:rPr lang="pt-BR" dirty="0"/>
+              <a:t>É um estilo de programação que enfatiza os dados em detrimento das ações.</a:t>
+            </a:r>
+          </a:p>
+          <a:p>
+            <a:r>
+              <a:rPr lang="pt-BR" dirty="0"/>
+              <a:t>Seu foco principal está na transposição para um sistema de informação de um contexto específico do mundo real no qual existem objetos que interagem entre si e que possuem características, comportamentos e responsabilidades.</a:t>
+            </a:r>
+            <a:endParaRPr lang="pt-BR" b="1" dirty="0"/>
           </a:p>
         </p:txBody>
       </p:sp>
     </p:spTree>
     <p:extLst>
       <p:ext uri="{BB962C8B-B14F-4D97-AF65-F5344CB8AC3E}">
-        <p14:creationId xmlns:p14="http://schemas.microsoft.com/office/powerpoint/2010/main" val="2484064327"/>
+        <p14:creationId xmlns:p14="http://schemas.microsoft.com/office/powerpoint/2010/main" val="826133772"/>
+      </p:ext>
+    </p:extLst>
+  </p:cSld>
+  <p:clrMapOvr>
+    <a:masterClrMapping/>
+  </p:clrMapOvr>
+</p:sld>
+</file>
+
+<file path=ppt/slides/slide8.xml><?xml version="1.0" encoding="utf-8"?>
+<p:sld xmlns:a="http://schemas.openxmlformats.org/drawingml/2006/main" xmlns:r="http://schemas.openxmlformats.org/officeDocument/2006/relationships" xmlns:p="http://schemas.openxmlformats.org/presentationml/2006/main">
+  <p:cSld>
+    <p:spTree>
+      <p:nvGrpSpPr>
+        <p:cNvPr id="1" name=""/>
+        <p:cNvGrpSpPr/>
+        <p:nvPr/>
+      </p:nvGrpSpPr>
+      <p:grpSpPr>
+        <a:xfrm>
+          <a:off x="0" y="0"/>
+          <a:ext cx="0" cy="0"/>
+          <a:chOff x="0" y="0"/>
+          <a:chExt cx="0" cy="0"/>
+        </a:xfrm>
+      </p:grpSpPr>
+      <p:sp>
+        <p:nvSpPr>
+          <p:cNvPr id="5" name="Título 4"/>
+          <p:cNvSpPr>
+            <a:spLocks noGrp="1"/>
+          </p:cNvSpPr>
+          <p:nvPr>
+            <p:ph type="title"/>
+          </p:nvPr>
+        </p:nvSpPr>
+        <p:spPr/>
+        <p:txBody>
+          <a:bodyPr/>
+          <a:lstStyle/>
+          <a:p>
+            <a:r>
+              <a:rPr lang="pt-BR" dirty="0"/>
+              <a:t>O que são classes e objetos?</a:t>
+            </a:r>
+          </a:p>
+        </p:txBody>
+      </p:sp>
+      <p:pic>
+        <p:nvPicPr>
+          <p:cNvPr id="1026" name="Picture 2" descr="Imagem com dois retângulos lado a lado. O primeiro representa uma classe, apenas contorno do desenho de um carro; o segundo representa um objeto, com três carros desenhados.">
+            <a:extLst>
+              <a:ext uri="{FF2B5EF4-FFF2-40B4-BE49-F238E27FC236}">
+                <a16:creationId xmlns:a16="http://schemas.microsoft.com/office/drawing/2014/main" id="{416C6E33-87CC-47A0-9FA3-9301DA7903A2}"/>
+              </a:ext>
+            </a:extLst>
+          </p:cNvPr>
+          <p:cNvPicPr>
+            <a:picLocks noGrp="1" noChangeAspect="1" noChangeArrowheads="1"/>
+          </p:cNvPicPr>
+          <p:nvPr>
+            <p:ph idx="1"/>
+          </p:nvPr>
+        </p:nvPicPr>
+        <p:blipFill>
+          <a:blip r:embed="rId3">
+            <a:extLst>
+              <a:ext uri="{28A0092B-C50C-407E-A947-70E740481C1C}">
+                <a14:useLocalDpi xmlns:a14="http://schemas.microsoft.com/office/drawing/2010/main" val="0"/>
+              </a:ext>
+            </a:extLst>
+          </a:blip>
+          <a:srcRect/>
+          <a:stretch>
+            <a:fillRect/>
+          </a:stretch>
+        </p:blipFill>
+        <p:spPr bwMode="auto">
+          <a:xfrm>
+            <a:off x="3051337" y="1387158"/>
+            <a:ext cx="6089327" cy="4262528"/>
+          </a:xfrm>
+          <a:prstGeom prst="rect">
+            <a:avLst/>
+          </a:prstGeom>
+          <a:noFill/>
+          <a:extLst>
+            <a:ext uri="{909E8E84-426E-40DD-AFC4-6F175D3DCCD1}">
+              <a14:hiddenFill xmlns:a14="http://schemas.microsoft.com/office/drawing/2010/main">
+                <a:solidFill>
+                  <a:srgbClr val="FFFFFF"/>
+                </a:solidFill>
+              </a14:hiddenFill>
+            </a:ext>
+          </a:extLst>
+        </p:spPr>
+      </p:pic>
+    </p:spTree>
+    <p:extLst>
+      <p:ext uri="{BB962C8B-B14F-4D97-AF65-F5344CB8AC3E}">
+        <p14:creationId xmlns:p14="http://schemas.microsoft.com/office/powerpoint/2010/main" val="2531866185"/>
+      </p:ext>
+    </p:extLst>
+  </p:cSld>
+  <p:clrMapOvr>
+    <a:masterClrMapping/>
+  </p:clrMapOvr>
+</p:sld>
+</file>
+
+<file path=ppt/slides/slide9.xml><?xml version="1.0" encoding="utf-8"?>
+<p:sld xmlns:a="http://schemas.openxmlformats.org/drawingml/2006/main" xmlns:r="http://schemas.openxmlformats.org/officeDocument/2006/relationships" xmlns:p="http://schemas.openxmlformats.org/presentationml/2006/main">
+  <p:cSld>
+    <p:spTree>
+      <p:nvGrpSpPr>
+        <p:cNvPr id="1" name=""/>
+        <p:cNvGrpSpPr/>
+        <p:nvPr/>
+      </p:nvGrpSpPr>
+      <p:grpSpPr>
+        <a:xfrm>
+          <a:off x="0" y="0"/>
+          <a:ext cx="0" cy="0"/>
+          <a:chOff x="0" y="0"/>
+          <a:chExt cx="0" cy="0"/>
+        </a:xfrm>
+      </p:grpSpPr>
+      <p:sp>
+        <p:nvSpPr>
+          <p:cNvPr id="5" name="Título 4"/>
+          <p:cNvSpPr>
+            <a:spLocks noGrp="1"/>
+          </p:cNvSpPr>
+          <p:nvPr>
+            <p:ph type="title"/>
+          </p:nvPr>
+        </p:nvSpPr>
+        <p:spPr/>
+        <p:txBody>
+          <a:bodyPr/>
+          <a:lstStyle/>
+          <a:p>
+            <a:r>
+              <a:rPr lang="pt-BR" dirty="0"/>
+              <a:t>Encapsulamento</a:t>
+            </a:r>
+          </a:p>
+        </p:txBody>
+      </p:sp>
+      <p:pic>
+        <p:nvPicPr>
+          <p:cNvPr id="2050" name="Picture 2" descr="Desenho de um carro, representando a classe &quot;carro&quot;, com os métodos e atributos da classe escritos dentro do desenho">
+            <a:extLst>
+              <a:ext uri="{FF2B5EF4-FFF2-40B4-BE49-F238E27FC236}">
+                <a16:creationId xmlns:a16="http://schemas.microsoft.com/office/drawing/2014/main" id="{9E62DAF1-F440-4376-98EE-64AB2D2434EF}"/>
+              </a:ext>
+            </a:extLst>
+          </p:cNvPr>
+          <p:cNvPicPr>
+            <a:picLocks noChangeAspect="1" noChangeArrowheads="1"/>
+          </p:cNvPicPr>
+          <p:nvPr/>
+        </p:nvPicPr>
+        <p:blipFill>
+          <a:blip r:embed="rId3">
+            <a:extLst>
+              <a:ext uri="{28A0092B-C50C-407E-A947-70E740481C1C}">
+                <a14:useLocalDpi xmlns:a14="http://schemas.microsoft.com/office/drawing/2010/main" val="0"/>
+              </a:ext>
+            </a:extLst>
+          </a:blip>
+          <a:srcRect/>
+          <a:stretch>
+            <a:fillRect/>
+          </a:stretch>
+        </p:blipFill>
+        <p:spPr bwMode="auto">
+          <a:xfrm>
+            <a:off x="3377293" y="1267627"/>
+            <a:ext cx="5437414" cy="4322745"/>
+          </a:xfrm>
+          <a:prstGeom prst="rect">
+            <a:avLst/>
+          </a:prstGeom>
+          <a:noFill/>
+          <a:extLst>
+            <a:ext uri="{909E8E84-426E-40DD-AFC4-6F175D3DCCD1}">
+              <a14:hiddenFill xmlns:a14="http://schemas.microsoft.com/office/drawing/2010/main">
+                <a:solidFill>
+                  <a:srgbClr val="FFFFFF"/>
+                </a:solidFill>
+              </a14:hiddenFill>
+            </a:ext>
+          </a:extLst>
+        </p:spPr>
+      </p:pic>
+    </p:spTree>
+    <p:extLst>
+      <p:ext uri="{BB962C8B-B14F-4D97-AF65-F5344CB8AC3E}">
+        <p14:creationId xmlns:p14="http://schemas.microsoft.com/office/powerpoint/2010/main" val="2011265147"/>
       </p:ext>
     </p:extLst>
   </p:cSld>

</xml_diff>

<commit_message>
add reference to classes
</commit_message>
<xml_diff>
--- a/React.pptx
+++ b/React.pptx
@@ -207,7 +207,7 @@
           <a:p>
             <a:fld id="{94D3EB41-CF60-4C9F-BD83-AE56FA0945EB}" type="datetimeFigureOut">
               <a:rPr lang="pt-BR" smtClean="0"/>
-              <a:t>19/10/2020</a:t>
+              <a:t>20/10/2020</a:t>
             </a:fld>
             <a:endParaRPr lang="pt-BR"/>
           </a:p>
@@ -1557,7 +1557,7 @@
           <a:p>
             <a:fld id="{9642BF85-54FF-46CE-B398-87F998CFD60B}" type="datetimeFigureOut">
               <a:rPr lang="pt-BR" smtClean="0"/>
-              <a:t>19/10/2020</a:t>
+              <a:t>20/10/2020</a:t>
             </a:fld>
             <a:endParaRPr lang="pt-BR"/>
           </a:p>
@@ -1725,7 +1725,7 @@
           <a:p>
             <a:fld id="{9642BF85-54FF-46CE-B398-87F998CFD60B}" type="datetimeFigureOut">
               <a:rPr lang="pt-BR" smtClean="0"/>
-              <a:t>19/10/2020</a:t>
+              <a:t>20/10/2020</a:t>
             </a:fld>
             <a:endParaRPr lang="pt-BR"/>
           </a:p>
@@ -1903,7 +1903,7 @@
           <a:p>
             <a:fld id="{9642BF85-54FF-46CE-B398-87F998CFD60B}" type="datetimeFigureOut">
               <a:rPr lang="pt-BR" smtClean="0"/>
-              <a:t>19/10/2020</a:t>
+              <a:t>20/10/2020</a:t>
             </a:fld>
             <a:endParaRPr lang="pt-BR"/>
           </a:p>
@@ -2240,7 +2240,7 @@
           <a:p>
             <a:fld id="{9642BF85-54FF-46CE-B398-87F998CFD60B}" type="datetimeFigureOut">
               <a:rPr lang="pt-BR" smtClean="0"/>
-              <a:t>19/10/2020</a:t>
+              <a:t>20/10/2020</a:t>
             </a:fld>
             <a:endParaRPr lang="pt-BR"/>
           </a:p>
@@ -2511,7 +2511,7 @@
           <a:p>
             <a:fld id="{9642BF85-54FF-46CE-B398-87F998CFD60B}" type="datetimeFigureOut">
               <a:rPr lang="pt-BR" smtClean="0"/>
-              <a:t>19/10/2020</a:t>
+              <a:t>20/10/2020</a:t>
             </a:fld>
             <a:endParaRPr lang="pt-BR"/>
           </a:p>
@@ -2757,7 +2757,7 @@
           <a:p>
             <a:fld id="{9642BF85-54FF-46CE-B398-87F998CFD60B}" type="datetimeFigureOut">
               <a:rPr lang="pt-BR" smtClean="0"/>
-              <a:t>19/10/2020</a:t>
+              <a:t>20/10/2020</a:t>
             </a:fld>
             <a:endParaRPr lang="pt-BR"/>
           </a:p>
@@ -3121,7 +3121,7 @@
           <a:p>
             <a:fld id="{9642BF85-54FF-46CE-B398-87F998CFD60B}" type="datetimeFigureOut">
               <a:rPr lang="pt-BR" smtClean="0"/>
-              <a:t>19/10/2020</a:t>
+              <a:t>20/10/2020</a:t>
             </a:fld>
             <a:endParaRPr lang="pt-BR"/>
           </a:p>
@@ -3255,7 +3255,7 @@
           <a:p>
             <a:fld id="{9642BF85-54FF-46CE-B398-87F998CFD60B}" type="datetimeFigureOut">
               <a:rPr lang="pt-BR" smtClean="0"/>
-              <a:t>19/10/2020</a:t>
+              <a:t>20/10/2020</a:t>
             </a:fld>
             <a:endParaRPr lang="pt-BR"/>
           </a:p>
@@ -3350,7 +3350,7 @@
           <a:p>
             <a:fld id="{9642BF85-54FF-46CE-B398-87F998CFD60B}" type="datetimeFigureOut">
               <a:rPr lang="pt-BR" smtClean="0"/>
-              <a:t>19/10/2020</a:t>
+              <a:t>20/10/2020</a:t>
             </a:fld>
             <a:endParaRPr lang="pt-BR"/>
           </a:p>
@@ -3625,7 +3625,7 @@
           <a:p>
             <a:fld id="{9642BF85-54FF-46CE-B398-87F998CFD60B}" type="datetimeFigureOut">
               <a:rPr lang="pt-BR" smtClean="0"/>
-              <a:t>19/10/2020</a:t>
+              <a:t>20/10/2020</a:t>
             </a:fld>
             <a:endParaRPr lang="pt-BR"/>
           </a:p>
@@ -3877,7 +3877,7 @@
           <a:p>
             <a:fld id="{9642BF85-54FF-46CE-B398-87F998CFD60B}" type="datetimeFigureOut">
               <a:rPr lang="pt-BR" smtClean="0"/>
-              <a:t>19/10/2020</a:t>
+              <a:t>20/10/2020</a:t>
             </a:fld>
             <a:endParaRPr lang="pt-BR"/>
           </a:p>
@@ -4097,7 +4097,7 @@
           <a:p>
             <a:fld id="{9642BF85-54FF-46CE-B398-87F998CFD60B}" type="datetimeFigureOut">
               <a:rPr lang="pt-BR" smtClean="0"/>
-              <a:t>19/10/2020</a:t>
+              <a:t>20/10/2020</a:t>
             </a:fld>
             <a:endParaRPr lang="pt-BR"/>
           </a:p>
@@ -4633,7 +4633,7 @@
           <a:p>
             <a:r>
               <a:rPr lang="pt-BR" dirty="0"/>
-              <a:t>Encapsulamento</a:t>
+              <a:t>Herança</a:t>
             </a:r>
           </a:p>
         </p:txBody>
@@ -4750,7 +4750,7 @@
         <p:spPr/>
         <p:txBody>
           <a:bodyPr>
-            <a:normAutofit lnSpcReduction="10000"/>
+            <a:normAutofit fontScale="85000" lnSpcReduction="10000"/>
           </a:bodyPr>
           <a:lstStyle/>
           <a:p>
@@ -4819,6 +4819,33 @@
                 <a:hlinkClick r:id="rId3"/>
               </a:rPr>
               <a:t>https://developer.mozilla.org/en-US/docs/Web/API/Document_Object_Model/Introduction</a:t>
+            </a:r>
+            <a:endParaRPr lang="pt-BR" dirty="0">
+              <a:hlinkClick r:id="rId4"/>
+            </a:endParaRPr>
+          </a:p>
+          <a:p>
+            <a:pPr marL="514350" indent="-514350" algn="l">
+              <a:buFont typeface="+mj-lt"/>
+              <a:buAutoNum type="arabicPeriod"/>
+            </a:pPr>
+            <a:r>
+              <a:rPr lang="pt-BR" dirty="0"/>
+              <a:t>MDN web docs. </a:t>
+            </a:r>
+            <a:r>
+              <a:rPr lang="pt-BR" b="1" dirty="0"/>
+              <a:t>Classes</a:t>
+            </a:r>
+            <a:r>
+              <a:rPr lang="pt-BR" dirty="0"/>
+              <a:t>. Disponível em: </a:t>
+            </a:r>
+            <a:r>
+              <a:rPr lang="pt-BR" dirty="0">
+                <a:hlinkClick r:id="rId5"/>
+              </a:rPr>
+              <a:t>https://developer.mozilla.org/pt-BR/docs/Web/JavaScript/Reference/Classes</a:t>
             </a:r>
             <a:endParaRPr lang="pt-BR" dirty="0">
               <a:hlinkClick r:id="rId4"/>

</xml_diff>

<commit_message>
adição de novos slides
</commit_message>
<xml_diff>
--- a/React.pptx
+++ b/React.pptx
@@ -6,7 +6,7 @@
     <p:sldMasterId id="2147483661" r:id="rId2"/>
   </p:sldMasterIdLst>
   <p:notesMasterIdLst>
-    <p:notesMasterId r:id="rId46"/>
+    <p:notesMasterId r:id="rId52"/>
   </p:notesMasterIdLst>
   <p:sldIdLst>
     <p:sldId id="256" r:id="rId3"/>
@@ -51,7 +51,13 @@
     <p:sldId id="301" r:id="rId42"/>
     <p:sldId id="302" r:id="rId43"/>
     <p:sldId id="303" r:id="rId44"/>
-    <p:sldId id="267" r:id="rId45"/>
+    <p:sldId id="305" r:id="rId45"/>
+    <p:sldId id="306" r:id="rId46"/>
+    <p:sldId id="308" r:id="rId47"/>
+    <p:sldId id="307" r:id="rId48"/>
+    <p:sldId id="309" r:id="rId49"/>
+    <p:sldId id="310" r:id="rId50"/>
+    <p:sldId id="267" r:id="rId51"/>
   </p:sldIdLst>
   <p:sldSz cx="12192000" cy="6858000"/>
   <p:notesSz cx="6858000" cy="9144000"/>
@@ -5739,7 +5745,7 @@
       </p:grpSpPr>
       <p:sp>
         <p:nvSpPr>
-          <p:cNvPr id="139" name="PlaceHolder 1"/>
+          <p:cNvPr id="202" name="PlaceHolder 1"/>
           <p:cNvSpPr>
             <a:spLocks noGrp="1" noRot="1" noChangeAspect="1"/>
           </p:cNvSpPr>
@@ -5749,17 +5755,17 @@
         </p:nvSpPr>
         <p:spPr>
           <a:xfrm>
-            <a:off x="685800" y="1143000"/>
-            <a:ext cx="5484813" cy="3084513"/>
-          </a:xfrm>
-          <a:prstGeom prst="rect">
-            <a:avLst/>
-          </a:prstGeom>
-        </p:spPr>
-      </p:sp>
-      <p:sp>
-        <p:nvSpPr>
-          <p:cNvPr id="140" name="PlaceHolder 2"/>
+            <a:off x="687388" y="1143000"/>
+            <a:ext cx="5480050" cy="3082925"/>
+          </a:xfrm>
+          <a:prstGeom prst="rect">
+            <a:avLst/>
+          </a:prstGeom>
+        </p:spPr>
+      </p:sp>
+      <p:sp>
+        <p:nvSpPr>
+          <p:cNvPr id="203" name="PlaceHolder 2"/>
           <p:cNvSpPr>
             <a:spLocks noGrp="1"/>
           </p:cNvSpPr>
@@ -5770,7 +5776,7 @@
         <p:spPr>
           <a:xfrm>
             <a:off x="685800" y="4400640"/>
-            <a:ext cx="5485320" cy="3599280"/>
+            <a:ext cx="5482440" cy="3596400"/>
           </a:xfrm>
           <a:prstGeom prst="rect">
             <a:avLst/>
@@ -5782,22 +5788,22 @@
           </a:bodyPr>
           <a:lstStyle/>
           <a:p>
-            <a:endParaRPr lang="pt-BR" sz="2000" b="0" strike="noStrike" spc="-1">
-              <a:latin typeface="Arial"/>
+            <a:endParaRPr lang="pt-BR" sz="2000" b="0" strike="noStrike" spc="-1" dirty="0">
+              <a:latin typeface="+mn-lt"/>
             </a:endParaRPr>
           </a:p>
         </p:txBody>
       </p:sp>
       <p:sp>
         <p:nvSpPr>
-          <p:cNvPr id="141" name="CustomShape 3"/>
+          <p:cNvPr id="204" name="CustomShape 3"/>
           <p:cNvSpPr/>
           <p:nvPr/>
         </p:nvSpPr>
         <p:spPr>
           <a:xfrm>
             <a:off x="3884760" y="8685360"/>
-            <a:ext cx="2970720" cy="457560"/>
+            <a:ext cx="2967840" cy="454680"/>
           </a:xfrm>
           <a:prstGeom prst="rect">
             <a:avLst/>
@@ -5830,6 +5836,840 @@
                 <a:spcPct val="100000"/>
               </a:lnSpc>
             </a:pPr>
+            <a:fld id="{EECC64C6-2FBD-4770-B109-62040DE39BC9}" type="slidenum">
+              <a:rPr lang="pt-BR" sz="1200" b="0" strike="noStrike" spc="-1">
+                <a:solidFill>
+                  <a:srgbClr val="000000"/>
+                </a:solidFill>
+                <a:latin typeface="Times New Roman"/>
+                <a:ea typeface="+mn-ea"/>
+              </a:rPr>
+              <a:t>43</a:t>
+            </a:fld>
+            <a:endParaRPr lang="pt-BR" sz="1200" b="0" strike="noStrike" spc="-1">
+              <a:latin typeface="Arial"/>
+            </a:endParaRPr>
+          </a:p>
+        </p:txBody>
+      </p:sp>
+    </p:spTree>
+    <p:extLst>
+      <p:ext uri="{BB962C8B-B14F-4D97-AF65-F5344CB8AC3E}">
+        <p14:creationId xmlns:p14="http://schemas.microsoft.com/office/powerpoint/2010/main" val="1964568223"/>
+      </p:ext>
+    </p:extLst>
+  </p:cSld>
+  <p:clrMapOvr>
+    <a:masterClrMapping/>
+  </p:clrMapOvr>
+</p:notes>
+</file>
+
+<file path=ppt/notesSlides/notesSlide44.xml><?xml version="1.0" encoding="utf-8"?>
+<p:notes xmlns:a="http://schemas.openxmlformats.org/drawingml/2006/main" xmlns:r="http://schemas.openxmlformats.org/officeDocument/2006/relationships" xmlns:p="http://schemas.openxmlformats.org/presentationml/2006/main">
+  <p:cSld>
+    <p:spTree>
+      <p:nvGrpSpPr>
+        <p:cNvPr id="1" name=""/>
+        <p:cNvGrpSpPr/>
+        <p:nvPr/>
+      </p:nvGrpSpPr>
+      <p:grpSpPr>
+        <a:xfrm>
+          <a:off x="0" y="0"/>
+          <a:ext cx="0" cy="0"/>
+          <a:chOff x="0" y="0"/>
+          <a:chExt cx="0" cy="0"/>
+        </a:xfrm>
+      </p:grpSpPr>
+      <p:sp>
+        <p:nvSpPr>
+          <p:cNvPr id="202" name="PlaceHolder 1"/>
+          <p:cNvSpPr>
+            <a:spLocks noGrp="1" noRot="1" noChangeAspect="1"/>
+          </p:cNvSpPr>
+          <p:nvPr>
+            <p:ph type="sldImg"/>
+          </p:nvPr>
+        </p:nvSpPr>
+        <p:spPr>
+          <a:xfrm>
+            <a:off x="687388" y="1143000"/>
+            <a:ext cx="5480050" cy="3082925"/>
+          </a:xfrm>
+          <a:prstGeom prst="rect">
+            <a:avLst/>
+          </a:prstGeom>
+        </p:spPr>
+      </p:sp>
+      <p:sp>
+        <p:nvSpPr>
+          <p:cNvPr id="203" name="PlaceHolder 2"/>
+          <p:cNvSpPr>
+            <a:spLocks noGrp="1"/>
+          </p:cNvSpPr>
+          <p:nvPr>
+            <p:ph type="body"/>
+          </p:nvPr>
+        </p:nvSpPr>
+        <p:spPr>
+          <a:xfrm>
+            <a:off x="685800" y="4400640"/>
+            <a:ext cx="5482440" cy="3596400"/>
+          </a:xfrm>
+          <a:prstGeom prst="rect">
+            <a:avLst/>
+          </a:prstGeom>
+        </p:spPr>
+        <p:txBody>
+          <a:bodyPr lIns="0" tIns="0" rIns="0" bIns="0">
+            <a:noAutofit/>
+          </a:bodyPr>
+          <a:lstStyle/>
+          <a:p>
+            <a:endParaRPr lang="pt-BR" sz="2000" b="0" strike="noStrike" spc="-1" dirty="0">
+              <a:latin typeface="+mn-lt"/>
+            </a:endParaRPr>
+          </a:p>
+        </p:txBody>
+      </p:sp>
+      <p:sp>
+        <p:nvSpPr>
+          <p:cNvPr id="204" name="CustomShape 3"/>
+          <p:cNvSpPr/>
+          <p:nvPr/>
+        </p:nvSpPr>
+        <p:spPr>
+          <a:xfrm>
+            <a:off x="3884760" y="8685360"/>
+            <a:ext cx="2967840" cy="454680"/>
+          </a:xfrm>
+          <a:prstGeom prst="rect">
+            <a:avLst/>
+          </a:prstGeom>
+          <a:noFill/>
+          <a:ln>
+            <a:noFill/>
+          </a:ln>
+        </p:spPr>
+        <p:style>
+          <a:lnRef idx="0">
+            <a:scrgbClr r="0" g="0" b="0"/>
+          </a:lnRef>
+          <a:fillRef idx="0">
+            <a:scrgbClr r="0" g="0" b="0"/>
+          </a:fillRef>
+          <a:effectRef idx="0">
+            <a:scrgbClr r="0" g="0" b="0"/>
+          </a:effectRef>
+          <a:fontRef idx="minor"/>
+        </p:style>
+        <p:txBody>
+          <a:bodyPr lIns="90000" tIns="45000" rIns="90000" bIns="45000" anchor="b">
+            <a:noAutofit/>
+          </a:bodyPr>
+          <a:lstStyle/>
+          <a:p>
+            <a:pPr algn="r">
+              <a:lnSpc>
+                <a:spcPct val="100000"/>
+              </a:lnSpc>
+            </a:pPr>
+            <a:fld id="{EECC64C6-2FBD-4770-B109-62040DE39BC9}" type="slidenum">
+              <a:rPr lang="pt-BR" sz="1200" b="0" strike="noStrike" spc="-1">
+                <a:solidFill>
+                  <a:srgbClr val="000000"/>
+                </a:solidFill>
+                <a:latin typeface="Times New Roman"/>
+                <a:ea typeface="+mn-ea"/>
+              </a:rPr>
+              <a:t>44</a:t>
+            </a:fld>
+            <a:endParaRPr lang="pt-BR" sz="1200" b="0" strike="noStrike" spc="-1">
+              <a:latin typeface="Arial"/>
+            </a:endParaRPr>
+          </a:p>
+        </p:txBody>
+      </p:sp>
+    </p:spTree>
+    <p:extLst>
+      <p:ext uri="{BB962C8B-B14F-4D97-AF65-F5344CB8AC3E}">
+        <p14:creationId xmlns:p14="http://schemas.microsoft.com/office/powerpoint/2010/main" val="3453260011"/>
+      </p:ext>
+    </p:extLst>
+  </p:cSld>
+  <p:clrMapOvr>
+    <a:masterClrMapping/>
+  </p:clrMapOvr>
+</p:notes>
+</file>
+
+<file path=ppt/notesSlides/notesSlide45.xml><?xml version="1.0" encoding="utf-8"?>
+<p:notes xmlns:a="http://schemas.openxmlformats.org/drawingml/2006/main" xmlns:r="http://schemas.openxmlformats.org/officeDocument/2006/relationships" xmlns:p="http://schemas.openxmlformats.org/presentationml/2006/main">
+  <p:cSld>
+    <p:spTree>
+      <p:nvGrpSpPr>
+        <p:cNvPr id="1" name=""/>
+        <p:cNvGrpSpPr/>
+        <p:nvPr/>
+      </p:nvGrpSpPr>
+      <p:grpSpPr>
+        <a:xfrm>
+          <a:off x="0" y="0"/>
+          <a:ext cx="0" cy="0"/>
+          <a:chOff x="0" y="0"/>
+          <a:chExt cx="0" cy="0"/>
+        </a:xfrm>
+      </p:grpSpPr>
+      <p:sp>
+        <p:nvSpPr>
+          <p:cNvPr id="202" name="PlaceHolder 1"/>
+          <p:cNvSpPr>
+            <a:spLocks noGrp="1" noRot="1" noChangeAspect="1"/>
+          </p:cNvSpPr>
+          <p:nvPr>
+            <p:ph type="sldImg"/>
+          </p:nvPr>
+        </p:nvSpPr>
+        <p:spPr>
+          <a:xfrm>
+            <a:off x="687388" y="1143000"/>
+            <a:ext cx="5480050" cy="3082925"/>
+          </a:xfrm>
+          <a:prstGeom prst="rect">
+            <a:avLst/>
+          </a:prstGeom>
+        </p:spPr>
+      </p:sp>
+      <p:sp>
+        <p:nvSpPr>
+          <p:cNvPr id="203" name="PlaceHolder 2"/>
+          <p:cNvSpPr>
+            <a:spLocks noGrp="1"/>
+          </p:cNvSpPr>
+          <p:nvPr>
+            <p:ph type="body"/>
+          </p:nvPr>
+        </p:nvSpPr>
+        <p:spPr>
+          <a:xfrm>
+            <a:off x="685800" y="4400640"/>
+            <a:ext cx="5482440" cy="3596400"/>
+          </a:xfrm>
+          <a:prstGeom prst="rect">
+            <a:avLst/>
+          </a:prstGeom>
+        </p:spPr>
+        <p:txBody>
+          <a:bodyPr lIns="0" tIns="0" rIns="0" bIns="0">
+            <a:noAutofit/>
+          </a:bodyPr>
+          <a:lstStyle/>
+          <a:p>
+            <a:endParaRPr lang="pt-BR" sz="2000" b="0" strike="noStrike" spc="-1" dirty="0">
+              <a:latin typeface="+mn-lt"/>
+            </a:endParaRPr>
+          </a:p>
+        </p:txBody>
+      </p:sp>
+      <p:sp>
+        <p:nvSpPr>
+          <p:cNvPr id="204" name="CustomShape 3"/>
+          <p:cNvSpPr/>
+          <p:nvPr/>
+        </p:nvSpPr>
+        <p:spPr>
+          <a:xfrm>
+            <a:off x="3884760" y="8685360"/>
+            <a:ext cx="2967840" cy="454680"/>
+          </a:xfrm>
+          <a:prstGeom prst="rect">
+            <a:avLst/>
+          </a:prstGeom>
+          <a:noFill/>
+          <a:ln>
+            <a:noFill/>
+          </a:ln>
+        </p:spPr>
+        <p:style>
+          <a:lnRef idx="0">
+            <a:scrgbClr r="0" g="0" b="0"/>
+          </a:lnRef>
+          <a:fillRef idx="0">
+            <a:scrgbClr r="0" g="0" b="0"/>
+          </a:fillRef>
+          <a:effectRef idx="0">
+            <a:scrgbClr r="0" g="0" b="0"/>
+          </a:effectRef>
+          <a:fontRef idx="minor"/>
+        </p:style>
+        <p:txBody>
+          <a:bodyPr lIns="90000" tIns="45000" rIns="90000" bIns="45000" anchor="b">
+            <a:noAutofit/>
+          </a:bodyPr>
+          <a:lstStyle/>
+          <a:p>
+            <a:pPr algn="r">
+              <a:lnSpc>
+                <a:spcPct val="100000"/>
+              </a:lnSpc>
+            </a:pPr>
+            <a:fld id="{EECC64C6-2FBD-4770-B109-62040DE39BC9}" type="slidenum">
+              <a:rPr lang="pt-BR" sz="1200" b="0" strike="noStrike" spc="-1">
+                <a:solidFill>
+                  <a:srgbClr val="000000"/>
+                </a:solidFill>
+                <a:latin typeface="Times New Roman"/>
+                <a:ea typeface="+mn-ea"/>
+              </a:rPr>
+              <a:t>45</a:t>
+            </a:fld>
+            <a:endParaRPr lang="pt-BR" sz="1200" b="0" strike="noStrike" spc="-1">
+              <a:latin typeface="Arial"/>
+            </a:endParaRPr>
+          </a:p>
+        </p:txBody>
+      </p:sp>
+    </p:spTree>
+    <p:extLst>
+      <p:ext uri="{BB962C8B-B14F-4D97-AF65-F5344CB8AC3E}">
+        <p14:creationId xmlns:p14="http://schemas.microsoft.com/office/powerpoint/2010/main" val="104187682"/>
+      </p:ext>
+    </p:extLst>
+  </p:cSld>
+  <p:clrMapOvr>
+    <a:masterClrMapping/>
+  </p:clrMapOvr>
+</p:notes>
+</file>
+
+<file path=ppt/notesSlides/notesSlide46.xml><?xml version="1.0" encoding="utf-8"?>
+<p:notes xmlns:a="http://schemas.openxmlformats.org/drawingml/2006/main" xmlns:r="http://schemas.openxmlformats.org/officeDocument/2006/relationships" xmlns:p="http://schemas.openxmlformats.org/presentationml/2006/main">
+  <p:cSld>
+    <p:spTree>
+      <p:nvGrpSpPr>
+        <p:cNvPr id="1" name=""/>
+        <p:cNvGrpSpPr/>
+        <p:nvPr/>
+      </p:nvGrpSpPr>
+      <p:grpSpPr>
+        <a:xfrm>
+          <a:off x="0" y="0"/>
+          <a:ext cx="0" cy="0"/>
+          <a:chOff x="0" y="0"/>
+          <a:chExt cx="0" cy="0"/>
+        </a:xfrm>
+      </p:grpSpPr>
+      <p:sp>
+        <p:nvSpPr>
+          <p:cNvPr id="202" name="PlaceHolder 1"/>
+          <p:cNvSpPr>
+            <a:spLocks noGrp="1" noRot="1" noChangeAspect="1"/>
+          </p:cNvSpPr>
+          <p:nvPr>
+            <p:ph type="sldImg"/>
+          </p:nvPr>
+        </p:nvSpPr>
+        <p:spPr>
+          <a:xfrm>
+            <a:off x="687388" y="1143000"/>
+            <a:ext cx="5480050" cy="3082925"/>
+          </a:xfrm>
+          <a:prstGeom prst="rect">
+            <a:avLst/>
+          </a:prstGeom>
+        </p:spPr>
+      </p:sp>
+      <p:sp>
+        <p:nvSpPr>
+          <p:cNvPr id="203" name="PlaceHolder 2"/>
+          <p:cNvSpPr>
+            <a:spLocks noGrp="1"/>
+          </p:cNvSpPr>
+          <p:nvPr>
+            <p:ph type="body"/>
+          </p:nvPr>
+        </p:nvSpPr>
+        <p:spPr>
+          <a:xfrm>
+            <a:off x="685800" y="4400640"/>
+            <a:ext cx="5482440" cy="3596400"/>
+          </a:xfrm>
+          <a:prstGeom prst="rect">
+            <a:avLst/>
+          </a:prstGeom>
+        </p:spPr>
+        <p:txBody>
+          <a:bodyPr lIns="0" tIns="0" rIns="0" bIns="0">
+            <a:noAutofit/>
+          </a:bodyPr>
+          <a:lstStyle/>
+          <a:p>
+            <a:endParaRPr lang="pt-BR" sz="2000" b="0" strike="noStrike" spc="-1" dirty="0">
+              <a:latin typeface="+mn-lt"/>
+            </a:endParaRPr>
+          </a:p>
+        </p:txBody>
+      </p:sp>
+      <p:sp>
+        <p:nvSpPr>
+          <p:cNvPr id="204" name="CustomShape 3"/>
+          <p:cNvSpPr/>
+          <p:nvPr/>
+        </p:nvSpPr>
+        <p:spPr>
+          <a:xfrm>
+            <a:off x="3884760" y="8685360"/>
+            <a:ext cx="2967840" cy="454680"/>
+          </a:xfrm>
+          <a:prstGeom prst="rect">
+            <a:avLst/>
+          </a:prstGeom>
+          <a:noFill/>
+          <a:ln>
+            <a:noFill/>
+          </a:ln>
+        </p:spPr>
+        <p:style>
+          <a:lnRef idx="0">
+            <a:scrgbClr r="0" g="0" b="0"/>
+          </a:lnRef>
+          <a:fillRef idx="0">
+            <a:scrgbClr r="0" g="0" b="0"/>
+          </a:fillRef>
+          <a:effectRef idx="0">
+            <a:scrgbClr r="0" g="0" b="0"/>
+          </a:effectRef>
+          <a:fontRef idx="minor"/>
+        </p:style>
+        <p:txBody>
+          <a:bodyPr lIns="90000" tIns="45000" rIns="90000" bIns="45000" anchor="b">
+            <a:noAutofit/>
+          </a:bodyPr>
+          <a:lstStyle/>
+          <a:p>
+            <a:pPr algn="r">
+              <a:lnSpc>
+                <a:spcPct val="100000"/>
+              </a:lnSpc>
+            </a:pPr>
+            <a:fld id="{EECC64C6-2FBD-4770-B109-62040DE39BC9}" type="slidenum">
+              <a:rPr lang="pt-BR" sz="1200" b="0" strike="noStrike" spc="-1">
+                <a:solidFill>
+                  <a:srgbClr val="000000"/>
+                </a:solidFill>
+                <a:latin typeface="Times New Roman"/>
+                <a:ea typeface="+mn-ea"/>
+              </a:rPr>
+              <a:t>46</a:t>
+            </a:fld>
+            <a:endParaRPr lang="pt-BR" sz="1200" b="0" strike="noStrike" spc="-1">
+              <a:latin typeface="Arial"/>
+            </a:endParaRPr>
+          </a:p>
+        </p:txBody>
+      </p:sp>
+    </p:spTree>
+    <p:extLst>
+      <p:ext uri="{BB962C8B-B14F-4D97-AF65-F5344CB8AC3E}">
+        <p14:creationId xmlns:p14="http://schemas.microsoft.com/office/powerpoint/2010/main" val="1139607905"/>
+      </p:ext>
+    </p:extLst>
+  </p:cSld>
+  <p:clrMapOvr>
+    <a:masterClrMapping/>
+  </p:clrMapOvr>
+</p:notes>
+</file>
+
+<file path=ppt/notesSlides/notesSlide47.xml><?xml version="1.0" encoding="utf-8"?>
+<p:notes xmlns:a="http://schemas.openxmlformats.org/drawingml/2006/main" xmlns:r="http://schemas.openxmlformats.org/officeDocument/2006/relationships" xmlns:p="http://schemas.openxmlformats.org/presentationml/2006/main">
+  <p:cSld>
+    <p:spTree>
+      <p:nvGrpSpPr>
+        <p:cNvPr id="1" name=""/>
+        <p:cNvGrpSpPr/>
+        <p:nvPr/>
+      </p:nvGrpSpPr>
+      <p:grpSpPr>
+        <a:xfrm>
+          <a:off x="0" y="0"/>
+          <a:ext cx="0" cy="0"/>
+          <a:chOff x="0" y="0"/>
+          <a:chExt cx="0" cy="0"/>
+        </a:xfrm>
+      </p:grpSpPr>
+      <p:sp>
+        <p:nvSpPr>
+          <p:cNvPr id="202" name="PlaceHolder 1"/>
+          <p:cNvSpPr>
+            <a:spLocks noGrp="1" noRot="1" noChangeAspect="1"/>
+          </p:cNvSpPr>
+          <p:nvPr>
+            <p:ph type="sldImg"/>
+          </p:nvPr>
+        </p:nvSpPr>
+        <p:spPr>
+          <a:xfrm>
+            <a:off x="687388" y="1143000"/>
+            <a:ext cx="5480050" cy="3082925"/>
+          </a:xfrm>
+          <a:prstGeom prst="rect">
+            <a:avLst/>
+          </a:prstGeom>
+        </p:spPr>
+      </p:sp>
+      <p:sp>
+        <p:nvSpPr>
+          <p:cNvPr id="203" name="PlaceHolder 2"/>
+          <p:cNvSpPr>
+            <a:spLocks noGrp="1"/>
+          </p:cNvSpPr>
+          <p:nvPr>
+            <p:ph type="body"/>
+          </p:nvPr>
+        </p:nvSpPr>
+        <p:spPr>
+          <a:xfrm>
+            <a:off x="685800" y="4400640"/>
+            <a:ext cx="5482440" cy="3596400"/>
+          </a:xfrm>
+          <a:prstGeom prst="rect">
+            <a:avLst/>
+          </a:prstGeom>
+        </p:spPr>
+        <p:txBody>
+          <a:bodyPr lIns="0" tIns="0" rIns="0" bIns="0">
+            <a:noAutofit/>
+          </a:bodyPr>
+          <a:lstStyle/>
+          <a:p>
+            <a:endParaRPr lang="pt-BR" sz="2000" b="0" strike="noStrike" spc="-1" dirty="0">
+              <a:latin typeface="+mn-lt"/>
+            </a:endParaRPr>
+          </a:p>
+        </p:txBody>
+      </p:sp>
+      <p:sp>
+        <p:nvSpPr>
+          <p:cNvPr id="204" name="CustomShape 3"/>
+          <p:cNvSpPr/>
+          <p:nvPr/>
+        </p:nvSpPr>
+        <p:spPr>
+          <a:xfrm>
+            <a:off x="3884760" y="8685360"/>
+            <a:ext cx="2967840" cy="454680"/>
+          </a:xfrm>
+          <a:prstGeom prst="rect">
+            <a:avLst/>
+          </a:prstGeom>
+          <a:noFill/>
+          <a:ln>
+            <a:noFill/>
+          </a:ln>
+        </p:spPr>
+        <p:style>
+          <a:lnRef idx="0">
+            <a:scrgbClr r="0" g="0" b="0"/>
+          </a:lnRef>
+          <a:fillRef idx="0">
+            <a:scrgbClr r="0" g="0" b="0"/>
+          </a:fillRef>
+          <a:effectRef idx="0">
+            <a:scrgbClr r="0" g="0" b="0"/>
+          </a:effectRef>
+          <a:fontRef idx="minor"/>
+        </p:style>
+        <p:txBody>
+          <a:bodyPr lIns="90000" tIns="45000" rIns="90000" bIns="45000" anchor="b">
+            <a:noAutofit/>
+          </a:bodyPr>
+          <a:lstStyle/>
+          <a:p>
+            <a:pPr algn="r">
+              <a:lnSpc>
+                <a:spcPct val="100000"/>
+              </a:lnSpc>
+            </a:pPr>
+            <a:fld id="{EECC64C6-2FBD-4770-B109-62040DE39BC9}" type="slidenum">
+              <a:rPr lang="pt-BR" sz="1200" b="0" strike="noStrike" spc="-1">
+                <a:solidFill>
+                  <a:srgbClr val="000000"/>
+                </a:solidFill>
+                <a:latin typeface="Times New Roman"/>
+                <a:ea typeface="+mn-ea"/>
+              </a:rPr>
+              <a:t>47</a:t>
+            </a:fld>
+            <a:endParaRPr lang="pt-BR" sz="1200" b="0" strike="noStrike" spc="-1">
+              <a:latin typeface="Arial"/>
+            </a:endParaRPr>
+          </a:p>
+        </p:txBody>
+      </p:sp>
+    </p:spTree>
+    <p:extLst>
+      <p:ext uri="{BB962C8B-B14F-4D97-AF65-F5344CB8AC3E}">
+        <p14:creationId xmlns:p14="http://schemas.microsoft.com/office/powerpoint/2010/main" val="1497237383"/>
+      </p:ext>
+    </p:extLst>
+  </p:cSld>
+  <p:clrMapOvr>
+    <a:masterClrMapping/>
+  </p:clrMapOvr>
+</p:notes>
+</file>
+
+<file path=ppt/notesSlides/notesSlide48.xml><?xml version="1.0" encoding="utf-8"?>
+<p:notes xmlns:a="http://schemas.openxmlformats.org/drawingml/2006/main" xmlns:r="http://schemas.openxmlformats.org/officeDocument/2006/relationships" xmlns:p="http://schemas.openxmlformats.org/presentationml/2006/main">
+  <p:cSld>
+    <p:spTree>
+      <p:nvGrpSpPr>
+        <p:cNvPr id="1" name=""/>
+        <p:cNvGrpSpPr/>
+        <p:nvPr/>
+      </p:nvGrpSpPr>
+      <p:grpSpPr>
+        <a:xfrm>
+          <a:off x="0" y="0"/>
+          <a:ext cx="0" cy="0"/>
+          <a:chOff x="0" y="0"/>
+          <a:chExt cx="0" cy="0"/>
+        </a:xfrm>
+      </p:grpSpPr>
+      <p:sp>
+        <p:nvSpPr>
+          <p:cNvPr id="202" name="PlaceHolder 1"/>
+          <p:cNvSpPr>
+            <a:spLocks noGrp="1" noRot="1" noChangeAspect="1"/>
+          </p:cNvSpPr>
+          <p:nvPr>
+            <p:ph type="sldImg"/>
+          </p:nvPr>
+        </p:nvSpPr>
+        <p:spPr>
+          <a:xfrm>
+            <a:off x="687388" y="1143000"/>
+            <a:ext cx="5480050" cy="3082925"/>
+          </a:xfrm>
+          <a:prstGeom prst="rect">
+            <a:avLst/>
+          </a:prstGeom>
+        </p:spPr>
+      </p:sp>
+      <p:sp>
+        <p:nvSpPr>
+          <p:cNvPr id="203" name="PlaceHolder 2"/>
+          <p:cNvSpPr>
+            <a:spLocks noGrp="1"/>
+          </p:cNvSpPr>
+          <p:nvPr>
+            <p:ph type="body"/>
+          </p:nvPr>
+        </p:nvSpPr>
+        <p:spPr>
+          <a:xfrm>
+            <a:off x="685800" y="4400640"/>
+            <a:ext cx="5482440" cy="3596400"/>
+          </a:xfrm>
+          <a:prstGeom prst="rect">
+            <a:avLst/>
+          </a:prstGeom>
+        </p:spPr>
+        <p:txBody>
+          <a:bodyPr lIns="0" tIns="0" rIns="0" bIns="0">
+            <a:noAutofit/>
+          </a:bodyPr>
+          <a:lstStyle/>
+          <a:p>
+            <a:endParaRPr lang="pt-BR" sz="2000" b="0" strike="noStrike" spc="-1" dirty="0">
+              <a:latin typeface="+mn-lt"/>
+            </a:endParaRPr>
+          </a:p>
+        </p:txBody>
+      </p:sp>
+      <p:sp>
+        <p:nvSpPr>
+          <p:cNvPr id="204" name="CustomShape 3"/>
+          <p:cNvSpPr/>
+          <p:nvPr/>
+        </p:nvSpPr>
+        <p:spPr>
+          <a:xfrm>
+            <a:off x="3884760" y="8685360"/>
+            <a:ext cx="2967840" cy="454680"/>
+          </a:xfrm>
+          <a:prstGeom prst="rect">
+            <a:avLst/>
+          </a:prstGeom>
+          <a:noFill/>
+          <a:ln>
+            <a:noFill/>
+          </a:ln>
+        </p:spPr>
+        <p:style>
+          <a:lnRef idx="0">
+            <a:scrgbClr r="0" g="0" b="0"/>
+          </a:lnRef>
+          <a:fillRef idx="0">
+            <a:scrgbClr r="0" g="0" b="0"/>
+          </a:fillRef>
+          <a:effectRef idx="0">
+            <a:scrgbClr r="0" g="0" b="0"/>
+          </a:effectRef>
+          <a:fontRef idx="minor"/>
+        </p:style>
+        <p:txBody>
+          <a:bodyPr lIns="90000" tIns="45000" rIns="90000" bIns="45000" anchor="b">
+            <a:noAutofit/>
+          </a:bodyPr>
+          <a:lstStyle/>
+          <a:p>
+            <a:pPr algn="r">
+              <a:lnSpc>
+                <a:spcPct val="100000"/>
+              </a:lnSpc>
+            </a:pPr>
+            <a:fld id="{EECC64C6-2FBD-4770-B109-62040DE39BC9}" type="slidenum">
+              <a:rPr lang="pt-BR" sz="1200" b="0" strike="noStrike" spc="-1">
+                <a:solidFill>
+                  <a:srgbClr val="000000"/>
+                </a:solidFill>
+                <a:latin typeface="Times New Roman"/>
+                <a:ea typeface="+mn-ea"/>
+              </a:rPr>
+              <a:t>48</a:t>
+            </a:fld>
+            <a:endParaRPr lang="pt-BR" sz="1200" b="0" strike="noStrike" spc="-1">
+              <a:latin typeface="Arial"/>
+            </a:endParaRPr>
+          </a:p>
+        </p:txBody>
+      </p:sp>
+    </p:spTree>
+    <p:extLst>
+      <p:ext uri="{BB962C8B-B14F-4D97-AF65-F5344CB8AC3E}">
+        <p14:creationId xmlns:p14="http://schemas.microsoft.com/office/powerpoint/2010/main" val="1792758557"/>
+      </p:ext>
+    </p:extLst>
+  </p:cSld>
+  <p:clrMapOvr>
+    <a:masterClrMapping/>
+  </p:clrMapOvr>
+</p:notes>
+</file>
+
+<file path=ppt/notesSlides/notesSlide49.xml><?xml version="1.0" encoding="utf-8"?>
+<p:notes xmlns:a="http://schemas.openxmlformats.org/drawingml/2006/main" xmlns:r="http://schemas.openxmlformats.org/officeDocument/2006/relationships" xmlns:p="http://schemas.openxmlformats.org/presentationml/2006/main">
+  <p:cSld>
+    <p:spTree>
+      <p:nvGrpSpPr>
+        <p:cNvPr id="1" name=""/>
+        <p:cNvGrpSpPr/>
+        <p:nvPr/>
+      </p:nvGrpSpPr>
+      <p:grpSpPr>
+        <a:xfrm>
+          <a:off x="0" y="0"/>
+          <a:ext cx="0" cy="0"/>
+          <a:chOff x="0" y="0"/>
+          <a:chExt cx="0" cy="0"/>
+        </a:xfrm>
+      </p:grpSpPr>
+      <p:sp>
+        <p:nvSpPr>
+          <p:cNvPr id="139" name="PlaceHolder 1"/>
+          <p:cNvSpPr>
+            <a:spLocks noGrp="1" noRot="1" noChangeAspect="1"/>
+          </p:cNvSpPr>
+          <p:nvPr>
+            <p:ph type="sldImg"/>
+          </p:nvPr>
+        </p:nvSpPr>
+        <p:spPr>
+          <a:xfrm>
+            <a:off x="685800" y="1143000"/>
+            <a:ext cx="5484813" cy="3084513"/>
+          </a:xfrm>
+          <a:prstGeom prst="rect">
+            <a:avLst/>
+          </a:prstGeom>
+        </p:spPr>
+      </p:sp>
+      <p:sp>
+        <p:nvSpPr>
+          <p:cNvPr id="140" name="PlaceHolder 2"/>
+          <p:cNvSpPr>
+            <a:spLocks noGrp="1"/>
+          </p:cNvSpPr>
+          <p:nvPr>
+            <p:ph type="body"/>
+          </p:nvPr>
+        </p:nvSpPr>
+        <p:spPr>
+          <a:xfrm>
+            <a:off x="685800" y="4400640"/>
+            <a:ext cx="5485320" cy="3599280"/>
+          </a:xfrm>
+          <a:prstGeom prst="rect">
+            <a:avLst/>
+          </a:prstGeom>
+        </p:spPr>
+        <p:txBody>
+          <a:bodyPr lIns="0" tIns="0" rIns="0" bIns="0">
+            <a:noAutofit/>
+          </a:bodyPr>
+          <a:lstStyle/>
+          <a:p>
+            <a:endParaRPr lang="pt-BR" sz="2000" b="0" strike="noStrike" spc="-1">
+              <a:latin typeface="Arial"/>
+            </a:endParaRPr>
+          </a:p>
+        </p:txBody>
+      </p:sp>
+      <p:sp>
+        <p:nvSpPr>
+          <p:cNvPr id="141" name="CustomShape 3"/>
+          <p:cNvSpPr/>
+          <p:nvPr/>
+        </p:nvSpPr>
+        <p:spPr>
+          <a:xfrm>
+            <a:off x="3884760" y="8685360"/>
+            <a:ext cx="2970720" cy="457560"/>
+          </a:xfrm>
+          <a:prstGeom prst="rect">
+            <a:avLst/>
+          </a:prstGeom>
+          <a:noFill/>
+          <a:ln>
+            <a:noFill/>
+          </a:ln>
+        </p:spPr>
+        <p:style>
+          <a:lnRef idx="0">
+            <a:scrgbClr r="0" g="0" b="0"/>
+          </a:lnRef>
+          <a:fillRef idx="0">
+            <a:scrgbClr r="0" g="0" b="0"/>
+          </a:fillRef>
+          <a:effectRef idx="0">
+            <a:scrgbClr r="0" g="0" b="0"/>
+          </a:effectRef>
+          <a:fontRef idx="minor"/>
+        </p:style>
+        <p:txBody>
+          <a:bodyPr lIns="90000" tIns="45000" rIns="90000" bIns="45000" anchor="b">
+            <a:noAutofit/>
+          </a:bodyPr>
+          <a:lstStyle/>
+          <a:p>
+            <a:pPr algn="r">
+              <a:lnSpc>
+                <a:spcPct val="100000"/>
+              </a:lnSpc>
+            </a:pPr>
             <a:fld id="{76541F3C-0A59-4F90-AFC6-6F0BC6A0EC2F}" type="slidenum">
               <a:rPr lang="pt-BR" sz="1200" b="0" strike="noStrike" spc="-1">
                 <a:solidFill>
@@ -5837,7 +6677,7 @@
                 </a:solidFill>
                 <a:latin typeface="Times New Roman"/>
               </a:rPr>
-              <a:t>43</a:t>
+              <a:t>49</a:t>
             </a:fld>
             <a:endParaRPr lang="pt-BR" sz="1200" b="0" strike="noStrike" spc="-1">
               <a:latin typeface="Arial"/>
@@ -10927,7 +11767,7 @@
     <mc:Choice Requires="p14">
       <p:transition spd="slow" p14:dur="2000" advTm="17000"/>
     </mc:Choice>
-    <mc:Fallback xmlns:p15="http://schemas.microsoft.com/office/powerpoint/2012/main" xmlns="">
+    <mc:Fallback xmlns="" xmlns:p15="http://schemas.microsoft.com/office/powerpoint/2012/main">
       <p:transition spd="slow" advTm="17000"/>
     </mc:Fallback>
   </mc:AlternateContent>
@@ -23348,6 +24188,2626 @@
 </file>
 
 <file path=ppt/slides/slide43.xml><?xml version="1.0" encoding="utf-8"?>
+<p:sld xmlns:a="http://schemas.openxmlformats.org/drawingml/2006/main" xmlns:r="http://schemas.openxmlformats.org/officeDocument/2006/relationships" xmlns:p="http://schemas.openxmlformats.org/presentationml/2006/main">
+  <p:cSld>
+    <p:spTree>
+      <p:nvGrpSpPr>
+        <p:cNvPr id="1" name=""/>
+        <p:cNvGrpSpPr/>
+        <p:nvPr/>
+      </p:nvGrpSpPr>
+      <p:grpSpPr>
+        <a:xfrm>
+          <a:off x="0" y="0"/>
+          <a:ext cx="0" cy="0"/>
+          <a:chOff x="0" y="0"/>
+          <a:chExt cx="0" cy="0"/>
+        </a:xfrm>
+      </p:grpSpPr>
+      <p:sp>
+        <p:nvSpPr>
+          <p:cNvPr id="98" name="CustomShape 1"/>
+          <p:cNvSpPr/>
+          <p:nvPr/>
+        </p:nvSpPr>
+        <p:spPr>
+          <a:xfrm>
+            <a:off x="0" y="224280"/>
+            <a:ext cx="12019320" cy="854640"/>
+          </a:xfrm>
+          <a:prstGeom prst="rect">
+            <a:avLst/>
+          </a:prstGeom>
+          <a:noFill/>
+          <a:ln>
+            <a:noFill/>
+          </a:ln>
+        </p:spPr>
+        <p:style>
+          <a:lnRef idx="0">
+            <a:scrgbClr r="0" g="0" b="0"/>
+          </a:lnRef>
+          <a:fillRef idx="0">
+            <a:scrgbClr r="0" g="0" b="0"/>
+          </a:fillRef>
+          <a:effectRef idx="0">
+            <a:scrgbClr r="0" g="0" b="0"/>
+          </a:effectRef>
+          <a:fontRef idx="minor"/>
+        </p:style>
+        <p:txBody>
+          <a:bodyPr lIns="90000" tIns="45000" rIns="90000" bIns="45000" anchor="ctr">
+            <a:noAutofit/>
+          </a:bodyPr>
+          <a:lstStyle/>
+          <a:p>
+            <a:pPr algn="ctr">
+              <a:lnSpc>
+                <a:spcPct val="90000"/>
+              </a:lnSpc>
+            </a:pPr>
+            <a:r>
+              <a:rPr lang="pt-BR" sz="5400" b="0" strike="noStrike" spc="-1" dirty="0">
+                <a:solidFill>
+                  <a:srgbClr val="1F4E79"/>
+                </a:solidFill>
+                <a:latin typeface="Arial"/>
+                <a:ea typeface="DejaVu Sans"/>
+              </a:rPr>
+              <a:t>Upload de arquivos</a:t>
+            </a:r>
+            <a:endParaRPr lang="pt-BR" sz="5400" b="0" strike="noStrike" spc="-1" dirty="0">
+              <a:latin typeface="Arial"/>
+            </a:endParaRPr>
+          </a:p>
+        </p:txBody>
+      </p:sp>
+      <p:sp>
+        <p:nvSpPr>
+          <p:cNvPr id="99" name="CustomShape 2"/>
+          <p:cNvSpPr/>
+          <p:nvPr/>
+        </p:nvSpPr>
+        <p:spPr>
+          <a:xfrm>
+            <a:off x="317520" y="1290960"/>
+            <a:ext cx="11701440" cy="4347360"/>
+          </a:xfrm>
+          <a:prstGeom prst="rect">
+            <a:avLst/>
+          </a:prstGeom>
+          <a:noFill/>
+          <a:ln>
+            <a:noFill/>
+          </a:ln>
+        </p:spPr>
+        <p:style>
+          <a:lnRef idx="0">
+            <a:scrgbClr r="0" g="0" b="0"/>
+          </a:lnRef>
+          <a:fillRef idx="0">
+            <a:scrgbClr r="0" g="0" b="0"/>
+          </a:fillRef>
+          <a:effectRef idx="0">
+            <a:scrgbClr r="0" g="0" b="0"/>
+          </a:effectRef>
+          <a:fontRef idx="minor"/>
+        </p:style>
+        <p:txBody>
+          <a:bodyPr lIns="90000" tIns="45000" rIns="90000" bIns="45000">
+            <a:normAutofit/>
+          </a:bodyPr>
+          <a:lstStyle/>
+          <a:p>
+            <a:pPr algn="ctr">
+              <a:lnSpc>
+                <a:spcPct val="100000"/>
+              </a:lnSpc>
+              <a:spcBef>
+                <a:spcPts val="1001"/>
+              </a:spcBef>
+              <a:spcAft>
+                <a:spcPts val="1001"/>
+              </a:spcAft>
+              <a:tabLst>
+                <a:tab pos="0" algn="l"/>
+              </a:tabLst>
+            </a:pPr>
+            <a:r>
+              <a:rPr lang="pt-BR" sz="3200" spc="-1" dirty="0">
+                <a:solidFill>
+                  <a:srgbClr val="1F4E79"/>
+                </a:solidFill>
+              </a:rPr>
+              <a:t>Podemos instalar os seguintes pacotes para submeter arquivos:</a:t>
+            </a:r>
+          </a:p>
+          <a:p>
+            <a:pPr algn="ctr">
+              <a:lnSpc>
+                <a:spcPct val="100000"/>
+              </a:lnSpc>
+              <a:spcBef>
+                <a:spcPts val="1001"/>
+              </a:spcBef>
+              <a:spcAft>
+                <a:spcPts val="1001"/>
+              </a:spcAft>
+              <a:tabLst>
+                <a:tab pos="0" algn="l"/>
+              </a:tabLst>
+            </a:pPr>
+            <a:r>
+              <a:rPr lang="nn-NO" sz="3200" spc="-1" dirty="0">
+                <a:solidFill>
+                  <a:srgbClr val="1F4E79"/>
+                </a:solidFill>
+                <a:latin typeface="Courier New" panose="02070309020205020404" pitchFamily="49" charset="0"/>
+                <a:cs typeface="Courier New" panose="02070309020205020404" pitchFamily="49" charset="0"/>
+              </a:rPr>
+              <a:t>yarn add material-ui-dropzone </a:t>
+            </a:r>
+            <a:r>
+              <a:rPr lang="pt-BR" sz="3200" spc="-1" dirty="0">
+                <a:solidFill>
+                  <a:srgbClr val="1F4E79"/>
+                </a:solidFill>
+                <a:latin typeface="Courier New" panose="02070309020205020404" pitchFamily="49" charset="0"/>
+                <a:cs typeface="Courier New" panose="02070309020205020404" pitchFamily="49" charset="0"/>
+              </a:rPr>
+              <a:t>material-ui-</a:t>
+            </a:r>
+            <a:r>
+              <a:rPr lang="pt-BR" sz="3200" spc="-1" dirty="0" err="1">
+                <a:solidFill>
+                  <a:srgbClr val="1F4E79"/>
+                </a:solidFill>
+                <a:latin typeface="Courier New" panose="02070309020205020404" pitchFamily="49" charset="0"/>
+                <a:cs typeface="Courier New" panose="02070309020205020404" pitchFamily="49" charset="0"/>
+              </a:rPr>
+              <a:t>icons</a:t>
+            </a:r>
+            <a:endParaRPr lang="nn-NO" sz="3200" spc="-1" dirty="0">
+              <a:solidFill>
+                <a:srgbClr val="1F4E79"/>
+              </a:solidFill>
+              <a:latin typeface="Courier New" panose="02070309020205020404" pitchFamily="49" charset="0"/>
+              <a:cs typeface="Courier New" panose="02070309020205020404" pitchFamily="49" charset="0"/>
+            </a:endParaRPr>
+          </a:p>
+          <a:p>
+            <a:pPr algn="ctr">
+              <a:lnSpc>
+                <a:spcPct val="100000"/>
+              </a:lnSpc>
+              <a:spcBef>
+                <a:spcPts val="1001"/>
+              </a:spcBef>
+              <a:spcAft>
+                <a:spcPts val="1001"/>
+              </a:spcAft>
+              <a:tabLst>
+                <a:tab pos="0" algn="l"/>
+              </a:tabLst>
+            </a:pPr>
+            <a:r>
+              <a:rPr lang="pt-BR" sz="3200" spc="-1" dirty="0" err="1">
+                <a:solidFill>
+                  <a:srgbClr val="1F4E79"/>
+                </a:solidFill>
+                <a:latin typeface="Courier New" panose="02070309020205020404" pitchFamily="49" charset="0"/>
+                <a:cs typeface="Courier New" panose="02070309020205020404" pitchFamily="49" charset="0"/>
+              </a:rPr>
+              <a:t>yarn</a:t>
+            </a:r>
+            <a:r>
+              <a:rPr lang="pt-BR" sz="3200" spc="-1" dirty="0">
+                <a:solidFill>
+                  <a:srgbClr val="1F4E79"/>
+                </a:solidFill>
+                <a:latin typeface="Courier New" panose="02070309020205020404" pitchFamily="49" charset="0"/>
+                <a:cs typeface="Courier New" panose="02070309020205020404" pitchFamily="49" charset="0"/>
+              </a:rPr>
+              <a:t> </a:t>
+            </a:r>
+            <a:r>
+              <a:rPr lang="pt-BR" sz="3200" spc="-1" dirty="0" err="1">
+                <a:solidFill>
+                  <a:srgbClr val="1F4E79"/>
+                </a:solidFill>
+                <a:latin typeface="Courier New" panose="02070309020205020404" pitchFamily="49" charset="0"/>
+                <a:cs typeface="Courier New" panose="02070309020205020404" pitchFamily="49" charset="0"/>
+              </a:rPr>
+              <a:t>add</a:t>
+            </a:r>
+            <a:r>
+              <a:rPr lang="pt-BR" sz="3200" spc="-1" dirty="0">
+                <a:solidFill>
+                  <a:srgbClr val="1F4E79"/>
+                </a:solidFill>
+                <a:latin typeface="Courier New" panose="02070309020205020404" pitchFamily="49" charset="0"/>
+                <a:cs typeface="Courier New" panose="02070309020205020404" pitchFamily="49" charset="0"/>
+              </a:rPr>
+              <a:t> -D @</a:t>
+            </a:r>
+            <a:r>
+              <a:rPr lang="pt-BR" sz="3200" spc="-1" dirty="0" err="1">
+                <a:solidFill>
+                  <a:srgbClr val="1F4E79"/>
+                </a:solidFill>
+                <a:latin typeface="Courier New" panose="02070309020205020404" pitchFamily="49" charset="0"/>
+                <a:cs typeface="Courier New" panose="02070309020205020404" pitchFamily="49" charset="0"/>
+              </a:rPr>
+              <a:t>types</a:t>
+            </a:r>
+            <a:r>
+              <a:rPr lang="pt-BR" sz="3200" spc="-1" dirty="0">
+                <a:solidFill>
+                  <a:srgbClr val="1F4E79"/>
+                </a:solidFill>
+                <a:latin typeface="Courier New" panose="02070309020205020404" pitchFamily="49" charset="0"/>
+                <a:cs typeface="Courier New" panose="02070309020205020404" pitchFamily="49" charset="0"/>
+              </a:rPr>
+              <a:t>/material-ui-</a:t>
+            </a:r>
+            <a:r>
+              <a:rPr lang="pt-BR" sz="3200" spc="-1" dirty="0" err="1">
+                <a:solidFill>
+                  <a:srgbClr val="1F4E79"/>
+                </a:solidFill>
+                <a:latin typeface="Courier New" panose="02070309020205020404" pitchFamily="49" charset="0"/>
+                <a:cs typeface="Courier New" panose="02070309020205020404" pitchFamily="49" charset="0"/>
+              </a:rPr>
+              <a:t>dropzone</a:t>
+            </a:r>
+            <a:r>
+              <a:rPr lang="en-US" sz="3200" spc="-1" dirty="0">
+                <a:solidFill>
+                  <a:srgbClr val="1F4E79"/>
+                </a:solidFill>
+                <a:latin typeface="Courier New" panose="02070309020205020404" pitchFamily="49" charset="0"/>
+                <a:cs typeface="Courier New" panose="02070309020205020404" pitchFamily="49" charset="0"/>
+              </a:rPr>
+              <a:t> @types/material-</a:t>
+            </a:r>
+            <a:r>
+              <a:rPr lang="en-US" sz="3200" spc="-1" dirty="0" err="1">
+                <a:solidFill>
+                  <a:srgbClr val="1F4E79"/>
+                </a:solidFill>
+                <a:latin typeface="Courier New" panose="02070309020205020404" pitchFamily="49" charset="0"/>
+                <a:cs typeface="Courier New" panose="02070309020205020404" pitchFamily="49" charset="0"/>
+              </a:rPr>
+              <a:t>ui</a:t>
+            </a:r>
+            <a:r>
+              <a:rPr lang="en-US" sz="3200" spc="-1" dirty="0">
+                <a:solidFill>
+                  <a:srgbClr val="1F4E79"/>
+                </a:solidFill>
+                <a:latin typeface="Courier New" panose="02070309020205020404" pitchFamily="49" charset="0"/>
+                <a:cs typeface="Courier New" panose="02070309020205020404" pitchFamily="49" charset="0"/>
+              </a:rPr>
+              <a:t>-icons</a:t>
+            </a:r>
+          </a:p>
+          <a:p>
+            <a:pPr algn="ctr">
+              <a:lnSpc>
+                <a:spcPct val="100000"/>
+              </a:lnSpc>
+              <a:spcBef>
+                <a:spcPts val="1001"/>
+              </a:spcBef>
+              <a:spcAft>
+                <a:spcPts val="1001"/>
+              </a:spcAft>
+              <a:tabLst>
+                <a:tab pos="0" algn="l"/>
+              </a:tabLst>
+            </a:pPr>
+            <a:r>
+              <a:rPr lang="pt-BR" sz="3200" spc="-1" dirty="0" err="1">
+                <a:solidFill>
+                  <a:srgbClr val="1F4E79"/>
+                </a:solidFill>
+                <a:latin typeface="Courier New" panose="02070309020205020404" pitchFamily="49" charset="0"/>
+                <a:cs typeface="Courier New" panose="02070309020205020404" pitchFamily="49" charset="0"/>
+              </a:rPr>
+              <a:t>yarn</a:t>
+            </a:r>
+            <a:r>
+              <a:rPr lang="pt-BR" sz="3200" spc="-1" dirty="0">
+                <a:solidFill>
+                  <a:srgbClr val="1F4E79"/>
+                </a:solidFill>
+                <a:latin typeface="Courier New" panose="02070309020205020404" pitchFamily="49" charset="0"/>
+                <a:cs typeface="Courier New" panose="02070309020205020404" pitchFamily="49" charset="0"/>
+              </a:rPr>
+              <a:t> </a:t>
+            </a:r>
+            <a:r>
+              <a:rPr lang="pt-BR" sz="3200" spc="-1" dirty="0" err="1">
+                <a:solidFill>
+                  <a:srgbClr val="1F4E79"/>
+                </a:solidFill>
+                <a:latin typeface="Courier New" panose="02070309020205020404" pitchFamily="49" charset="0"/>
+                <a:cs typeface="Courier New" panose="02070309020205020404" pitchFamily="49" charset="0"/>
+              </a:rPr>
+              <a:t>add</a:t>
+            </a:r>
+            <a:r>
+              <a:rPr lang="pt-BR" sz="3200" spc="-1" dirty="0">
+                <a:solidFill>
+                  <a:srgbClr val="1F4E79"/>
+                </a:solidFill>
+                <a:latin typeface="Courier New" panose="02070309020205020404" pitchFamily="49" charset="0"/>
+                <a:cs typeface="Courier New" panose="02070309020205020404" pitchFamily="49" charset="0"/>
+              </a:rPr>
+              <a:t> @material-ui/core @material-ui/</a:t>
+            </a:r>
+            <a:r>
+              <a:rPr lang="pt-BR" sz="3200" spc="-1" dirty="0" err="1">
+                <a:solidFill>
+                  <a:srgbClr val="1F4E79"/>
+                </a:solidFill>
+                <a:latin typeface="Courier New" panose="02070309020205020404" pitchFamily="49" charset="0"/>
+                <a:cs typeface="Courier New" panose="02070309020205020404" pitchFamily="49" charset="0"/>
+              </a:rPr>
+              <a:t>icons</a:t>
+            </a:r>
+            <a:endParaRPr lang="pt-BR" sz="3200" spc="-1" dirty="0">
+              <a:solidFill>
+                <a:srgbClr val="1F4E79"/>
+              </a:solidFill>
+              <a:latin typeface="Courier New" panose="02070309020205020404" pitchFamily="49" charset="0"/>
+              <a:cs typeface="Courier New" panose="02070309020205020404" pitchFamily="49" charset="0"/>
+            </a:endParaRPr>
+          </a:p>
+        </p:txBody>
+      </p:sp>
+    </p:spTree>
+    <p:extLst>
+      <p:ext uri="{BB962C8B-B14F-4D97-AF65-F5344CB8AC3E}">
+        <p14:creationId xmlns:p14="http://schemas.microsoft.com/office/powerpoint/2010/main" val="450660802"/>
+      </p:ext>
+    </p:extLst>
+  </p:cSld>
+  <p:clrMapOvr>
+    <a:masterClrMapping/>
+  </p:clrMapOvr>
+</p:sld>
+</file>
+
+<file path=ppt/slides/slide44.xml><?xml version="1.0" encoding="utf-8"?>
+<p:sld xmlns:a="http://schemas.openxmlformats.org/drawingml/2006/main" xmlns:r="http://schemas.openxmlformats.org/officeDocument/2006/relationships" xmlns:p="http://schemas.openxmlformats.org/presentationml/2006/main">
+  <p:cSld>
+    <p:spTree>
+      <p:nvGrpSpPr>
+        <p:cNvPr id="1" name=""/>
+        <p:cNvGrpSpPr/>
+        <p:nvPr/>
+      </p:nvGrpSpPr>
+      <p:grpSpPr>
+        <a:xfrm>
+          <a:off x="0" y="0"/>
+          <a:ext cx="0" cy="0"/>
+          <a:chOff x="0" y="0"/>
+          <a:chExt cx="0" cy="0"/>
+        </a:xfrm>
+      </p:grpSpPr>
+      <p:sp>
+        <p:nvSpPr>
+          <p:cNvPr id="98" name="CustomShape 1"/>
+          <p:cNvSpPr/>
+          <p:nvPr/>
+        </p:nvSpPr>
+        <p:spPr>
+          <a:xfrm>
+            <a:off x="0" y="224280"/>
+            <a:ext cx="12019320" cy="854640"/>
+          </a:xfrm>
+          <a:prstGeom prst="rect">
+            <a:avLst/>
+          </a:prstGeom>
+          <a:noFill/>
+          <a:ln>
+            <a:noFill/>
+          </a:ln>
+        </p:spPr>
+        <p:style>
+          <a:lnRef idx="0">
+            <a:scrgbClr r="0" g="0" b="0"/>
+          </a:lnRef>
+          <a:fillRef idx="0">
+            <a:scrgbClr r="0" g="0" b="0"/>
+          </a:fillRef>
+          <a:effectRef idx="0">
+            <a:scrgbClr r="0" g="0" b="0"/>
+          </a:effectRef>
+          <a:fontRef idx="minor"/>
+        </p:style>
+        <p:txBody>
+          <a:bodyPr lIns="90000" tIns="45000" rIns="90000" bIns="45000" anchor="ctr">
+            <a:noAutofit/>
+          </a:bodyPr>
+          <a:lstStyle/>
+          <a:p>
+            <a:pPr algn="ctr">
+              <a:lnSpc>
+                <a:spcPct val="90000"/>
+              </a:lnSpc>
+            </a:pPr>
+            <a:r>
+              <a:rPr lang="pt-BR" sz="5400" b="0" strike="noStrike" spc="-1" dirty="0">
+                <a:solidFill>
+                  <a:srgbClr val="1F4E79"/>
+                </a:solidFill>
+                <a:latin typeface="Arial"/>
+                <a:ea typeface="DejaVu Sans"/>
+              </a:rPr>
+              <a:t>Upload de arquivos</a:t>
+            </a:r>
+            <a:endParaRPr lang="pt-BR" sz="5400" b="0" strike="noStrike" spc="-1" dirty="0">
+              <a:latin typeface="Arial"/>
+            </a:endParaRPr>
+          </a:p>
+        </p:txBody>
+      </p:sp>
+      <p:sp>
+        <p:nvSpPr>
+          <p:cNvPr id="99" name="CustomShape 2"/>
+          <p:cNvSpPr/>
+          <p:nvPr/>
+        </p:nvSpPr>
+        <p:spPr>
+          <a:xfrm>
+            <a:off x="317520" y="1290960"/>
+            <a:ext cx="11701440" cy="4347360"/>
+          </a:xfrm>
+          <a:prstGeom prst="rect">
+            <a:avLst/>
+          </a:prstGeom>
+          <a:noFill/>
+          <a:ln>
+            <a:noFill/>
+          </a:ln>
+        </p:spPr>
+        <p:style>
+          <a:lnRef idx="0">
+            <a:scrgbClr r="0" g="0" b="0"/>
+          </a:lnRef>
+          <a:fillRef idx="0">
+            <a:scrgbClr r="0" g="0" b="0"/>
+          </a:fillRef>
+          <a:effectRef idx="0">
+            <a:scrgbClr r="0" g="0" b="0"/>
+          </a:effectRef>
+          <a:fontRef idx="minor"/>
+        </p:style>
+        <p:txBody>
+          <a:bodyPr lIns="90000" tIns="45000" rIns="90000" bIns="45000">
+            <a:normAutofit fontScale="70000" lnSpcReduction="20000"/>
+          </a:bodyPr>
+          <a:lstStyle/>
+          <a:p>
+            <a:pPr algn="ctr">
+              <a:lnSpc>
+                <a:spcPct val="100000"/>
+              </a:lnSpc>
+              <a:spcBef>
+                <a:spcPts val="1001"/>
+              </a:spcBef>
+              <a:spcAft>
+                <a:spcPts val="1001"/>
+              </a:spcAft>
+              <a:tabLst>
+                <a:tab pos="0" algn="l"/>
+              </a:tabLst>
+            </a:pPr>
+            <a:r>
+              <a:rPr lang="pt-BR" sz="3200" spc="-1" dirty="0">
+                <a:solidFill>
+                  <a:srgbClr val="1F4E79"/>
+                </a:solidFill>
+              </a:rPr>
+              <a:t>Segue um exemplo de como utilizar o componente </a:t>
+            </a:r>
+            <a:r>
+              <a:rPr lang="pt-BR" sz="3200" spc="-1" dirty="0">
+                <a:solidFill>
+                  <a:srgbClr val="1F4E79"/>
+                </a:solidFill>
+                <a:latin typeface="Courier New" panose="02070309020205020404" pitchFamily="49" charset="0"/>
+                <a:cs typeface="Courier New" panose="02070309020205020404" pitchFamily="49" charset="0"/>
+              </a:rPr>
+              <a:t>&lt;</a:t>
+            </a:r>
+            <a:r>
+              <a:rPr lang="nn-NO" sz="3200" spc="-1" dirty="0">
+                <a:solidFill>
+                  <a:srgbClr val="1F4E79"/>
+                </a:solidFill>
+                <a:latin typeface="Courier New" panose="02070309020205020404" pitchFamily="49" charset="0"/>
+                <a:cs typeface="Courier New" panose="02070309020205020404" pitchFamily="49" charset="0"/>
+              </a:rPr>
+              <a:t>DropzoneArea</a:t>
+            </a:r>
+            <a:r>
+              <a:rPr lang="pt-BR" sz="3200" spc="-1" dirty="0">
+                <a:solidFill>
+                  <a:srgbClr val="1F4E79"/>
+                </a:solidFill>
+                <a:latin typeface="Courier New" panose="02070309020205020404" pitchFamily="49" charset="0"/>
+                <a:cs typeface="Courier New" panose="02070309020205020404" pitchFamily="49" charset="0"/>
+              </a:rPr>
+              <a:t>&gt;</a:t>
+            </a:r>
+            <a:r>
+              <a:rPr lang="pt-BR" sz="3200" spc="-1" dirty="0">
+                <a:solidFill>
+                  <a:srgbClr val="1F4E79"/>
+                </a:solidFill>
+              </a:rPr>
+              <a:t>:</a:t>
+            </a:r>
+          </a:p>
+          <a:p>
+            <a:pPr>
+              <a:lnSpc>
+                <a:spcPct val="100000"/>
+              </a:lnSpc>
+              <a:spcBef>
+                <a:spcPts val="1001"/>
+              </a:spcBef>
+              <a:spcAft>
+                <a:spcPts val="1001"/>
+              </a:spcAft>
+              <a:tabLst>
+                <a:tab pos="0" algn="l"/>
+              </a:tabLst>
+            </a:pPr>
+            <a:r>
+              <a:rPr lang="nn-NO" sz="3200" spc="-1" dirty="0">
+                <a:solidFill>
+                  <a:srgbClr val="1F4E79"/>
+                </a:solidFill>
+                <a:latin typeface="Courier New" panose="02070309020205020404" pitchFamily="49" charset="0"/>
+                <a:cs typeface="Courier New" panose="02070309020205020404" pitchFamily="49" charset="0"/>
+              </a:rPr>
+              <a:t>&lt;DropzoneArea</a:t>
+            </a:r>
+          </a:p>
+          <a:p>
+            <a:pPr>
+              <a:lnSpc>
+                <a:spcPct val="100000"/>
+              </a:lnSpc>
+              <a:spcBef>
+                <a:spcPts val="1001"/>
+              </a:spcBef>
+              <a:spcAft>
+                <a:spcPts val="1001"/>
+              </a:spcAft>
+              <a:tabLst>
+                <a:tab pos="0" algn="l"/>
+              </a:tabLst>
+            </a:pPr>
+            <a:r>
+              <a:rPr lang="nn-NO" sz="3200" spc="-1" dirty="0">
+                <a:solidFill>
+                  <a:srgbClr val="1F4E79"/>
+                </a:solidFill>
+                <a:latin typeface="Courier New" panose="02070309020205020404" pitchFamily="49" charset="0"/>
+                <a:cs typeface="Courier New" panose="02070309020205020404" pitchFamily="49" charset="0"/>
+              </a:rPr>
+              <a:t>		dropzoneText="Arraste um arquivo ou clique para adicionar"</a:t>
+            </a:r>
+          </a:p>
+          <a:p>
+            <a:pPr>
+              <a:lnSpc>
+                <a:spcPct val="100000"/>
+              </a:lnSpc>
+              <a:spcBef>
+                <a:spcPts val="1001"/>
+              </a:spcBef>
+              <a:spcAft>
+                <a:spcPts val="1001"/>
+              </a:spcAft>
+              <a:tabLst>
+                <a:tab pos="0" algn="l"/>
+              </a:tabLst>
+            </a:pPr>
+            <a:r>
+              <a:rPr lang="nn-NO" sz="3200" spc="-1" dirty="0">
+                <a:solidFill>
+                  <a:srgbClr val="1F4E79"/>
+                </a:solidFill>
+                <a:latin typeface="Courier New" panose="02070309020205020404" pitchFamily="49" charset="0"/>
+                <a:cs typeface="Courier New" panose="02070309020205020404" pitchFamily="49" charset="0"/>
+              </a:rPr>
+              <a:t>		acceptedFiles={['image/*’]}</a:t>
+            </a:r>
+          </a:p>
+          <a:p>
+            <a:pPr>
+              <a:lnSpc>
+                <a:spcPct val="100000"/>
+              </a:lnSpc>
+              <a:spcBef>
+                <a:spcPts val="1001"/>
+              </a:spcBef>
+              <a:spcAft>
+                <a:spcPts val="1001"/>
+              </a:spcAft>
+              <a:tabLst>
+                <a:tab pos="0" algn="l"/>
+              </a:tabLst>
+            </a:pPr>
+            <a:r>
+              <a:rPr lang="nn-NO" sz="3200" spc="-1" dirty="0">
+                <a:solidFill>
+                  <a:srgbClr val="1F4E79"/>
+                </a:solidFill>
+                <a:latin typeface="Courier New" panose="02070309020205020404" pitchFamily="49" charset="0"/>
+                <a:cs typeface="Courier New" panose="02070309020205020404" pitchFamily="49" charset="0"/>
+              </a:rPr>
+              <a:t>		filesLimit={1}</a:t>
+            </a:r>
+          </a:p>
+          <a:p>
+            <a:pPr>
+              <a:lnSpc>
+                <a:spcPct val="100000"/>
+              </a:lnSpc>
+              <a:spcBef>
+                <a:spcPts val="1001"/>
+              </a:spcBef>
+              <a:spcAft>
+                <a:spcPts val="1001"/>
+              </a:spcAft>
+              <a:tabLst>
+                <a:tab pos="0" algn="l"/>
+              </a:tabLst>
+            </a:pPr>
+            <a:r>
+              <a:rPr lang="nn-NO" sz="3200" spc="-1" dirty="0">
+                <a:solidFill>
+                  <a:srgbClr val="1F4E79"/>
+                </a:solidFill>
+                <a:latin typeface="Courier New" panose="02070309020205020404" pitchFamily="49" charset="0"/>
+                <a:cs typeface="Courier New" panose="02070309020205020404" pitchFamily="49" charset="0"/>
+              </a:rPr>
+              <a:t>		onChange={(files) =&gt; setFile(files[0])}</a:t>
+            </a:r>
+          </a:p>
+          <a:p>
+            <a:pPr>
+              <a:lnSpc>
+                <a:spcPct val="100000"/>
+              </a:lnSpc>
+              <a:spcBef>
+                <a:spcPts val="1001"/>
+              </a:spcBef>
+              <a:spcAft>
+                <a:spcPts val="1001"/>
+              </a:spcAft>
+              <a:tabLst>
+                <a:tab pos="0" algn="l"/>
+              </a:tabLst>
+            </a:pPr>
+            <a:r>
+              <a:rPr lang="nn-NO" sz="3200" spc="-1" dirty="0">
+                <a:solidFill>
+                  <a:srgbClr val="1F4E79"/>
+                </a:solidFill>
+                <a:latin typeface="Courier New" panose="02070309020205020404" pitchFamily="49" charset="0"/>
+                <a:cs typeface="Courier New" panose="02070309020205020404" pitchFamily="49" charset="0"/>
+              </a:rPr>
+              <a:t>		maxFileSize={5000000}</a:t>
+            </a:r>
+          </a:p>
+          <a:p>
+            <a:pPr>
+              <a:lnSpc>
+                <a:spcPct val="100000"/>
+              </a:lnSpc>
+              <a:spcBef>
+                <a:spcPts val="1001"/>
+              </a:spcBef>
+              <a:spcAft>
+                <a:spcPts val="1001"/>
+              </a:spcAft>
+              <a:tabLst>
+                <a:tab pos="0" algn="l"/>
+              </a:tabLst>
+            </a:pPr>
+            <a:r>
+              <a:rPr lang="nn-NO" sz="3200" spc="-1" dirty="0">
+                <a:solidFill>
+                  <a:srgbClr val="1F4E79"/>
+                </a:solidFill>
+                <a:latin typeface="Courier New" panose="02070309020205020404" pitchFamily="49" charset="0"/>
+                <a:cs typeface="Courier New" panose="02070309020205020404" pitchFamily="49" charset="0"/>
+              </a:rPr>
+              <a:t>/&gt;</a:t>
+            </a:r>
+            <a:endParaRPr lang="pt-BR" sz="3200" spc="-1" dirty="0">
+              <a:solidFill>
+                <a:srgbClr val="1F4E79"/>
+              </a:solidFill>
+              <a:latin typeface="Courier New" panose="02070309020205020404" pitchFamily="49" charset="0"/>
+              <a:cs typeface="Courier New" panose="02070309020205020404" pitchFamily="49" charset="0"/>
+            </a:endParaRPr>
+          </a:p>
+        </p:txBody>
+      </p:sp>
+    </p:spTree>
+    <p:extLst>
+      <p:ext uri="{BB962C8B-B14F-4D97-AF65-F5344CB8AC3E}">
+        <p14:creationId xmlns:p14="http://schemas.microsoft.com/office/powerpoint/2010/main" val="751716766"/>
+      </p:ext>
+    </p:extLst>
+  </p:cSld>
+  <p:clrMapOvr>
+    <a:masterClrMapping/>
+  </p:clrMapOvr>
+</p:sld>
+</file>
+
+<file path=ppt/slides/slide45.xml><?xml version="1.0" encoding="utf-8"?>
+<p:sld xmlns:a="http://schemas.openxmlformats.org/drawingml/2006/main" xmlns:r="http://schemas.openxmlformats.org/officeDocument/2006/relationships" xmlns:p="http://schemas.openxmlformats.org/presentationml/2006/main">
+  <p:cSld>
+    <p:spTree>
+      <p:nvGrpSpPr>
+        <p:cNvPr id="1" name=""/>
+        <p:cNvGrpSpPr/>
+        <p:nvPr/>
+      </p:nvGrpSpPr>
+      <p:grpSpPr>
+        <a:xfrm>
+          <a:off x="0" y="0"/>
+          <a:ext cx="0" cy="0"/>
+          <a:chOff x="0" y="0"/>
+          <a:chExt cx="0" cy="0"/>
+        </a:xfrm>
+      </p:grpSpPr>
+      <p:sp>
+        <p:nvSpPr>
+          <p:cNvPr id="98" name="CustomShape 1"/>
+          <p:cNvSpPr/>
+          <p:nvPr/>
+        </p:nvSpPr>
+        <p:spPr>
+          <a:xfrm>
+            <a:off x="0" y="224280"/>
+            <a:ext cx="12019320" cy="854640"/>
+          </a:xfrm>
+          <a:prstGeom prst="rect">
+            <a:avLst/>
+          </a:prstGeom>
+          <a:noFill/>
+          <a:ln>
+            <a:noFill/>
+          </a:ln>
+        </p:spPr>
+        <p:style>
+          <a:lnRef idx="0">
+            <a:scrgbClr r="0" g="0" b="0"/>
+          </a:lnRef>
+          <a:fillRef idx="0">
+            <a:scrgbClr r="0" g="0" b="0"/>
+          </a:fillRef>
+          <a:effectRef idx="0">
+            <a:scrgbClr r="0" g="0" b="0"/>
+          </a:effectRef>
+          <a:fontRef idx="minor"/>
+        </p:style>
+        <p:txBody>
+          <a:bodyPr lIns="90000" tIns="45000" rIns="90000" bIns="45000" anchor="ctr">
+            <a:noAutofit/>
+          </a:bodyPr>
+          <a:lstStyle/>
+          <a:p>
+            <a:pPr algn="ctr">
+              <a:lnSpc>
+                <a:spcPct val="90000"/>
+              </a:lnSpc>
+            </a:pPr>
+            <a:r>
+              <a:rPr lang="pt-BR" sz="5400" b="0" strike="noStrike" spc="-1" dirty="0">
+                <a:solidFill>
+                  <a:srgbClr val="1F4E79"/>
+                </a:solidFill>
+                <a:latin typeface="Arial"/>
+                <a:ea typeface="DejaVu Sans"/>
+              </a:rPr>
+              <a:t>Upload de arquivos</a:t>
+            </a:r>
+            <a:endParaRPr lang="pt-BR" sz="5400" b="0" strike="noStrike" spc="-1" dirty="0">
+              <a:latin typeface="Arial"/>
+            </a:endParaRPr>
+          </a:p>
+        </p:txBody>
+      </p:sp>
+      <p:sp>
+        <p:nvSpPr>
+          <p:cNvPr id="99" name="CustomShape 2"/>
+          <p:cNvSpPr/>
+          <p:nvPr/>
+        </p:nvSpPr>
+        <p:spPr>
+          <a:xfrm>
+            <a:off x="317520" y="1290960"/>
+            <a:ext cx="11701440" cy="4347360"/>
+          </a:xfrm>
+          <a:prstGeom prst="rect">
+            <a:avLst/>
+          </a:prstGeom>
+          <a:noFill/>
+          <a:ln>
+            <a:noFill/>
+          </a:ln>
+        </p:spPr>
+        <p:style>
+          <a:lnRef idx="0">
+            <a:scrgbClr r="0" g="0" b="0"/>
+          </a:lnRef>
+          <a:fillRef idx="0">
+            <a:scrgbClr r="0" g="0" b="0"/>
+          </a:fillRef>
+          <a:effectRef idx="0">
+            <a:scrgbClr r="0" g="0" b="0"/>
+          </a:effectRef>
+          <a:fontRef idx="minor"/>
+        </p:style>
+        <p:txBody>
+          <a:bodyPr lIns="90000" tIns="45000" rIns="90000" bIns="45000">
+            <a:normAutofit/>
+          </a:bodyPr>
+          <a:lstStyle/>
+          <a:p>
+            <a:pPr algn="ctr">
+              <a:lnSpc>
+                <a:spcPct val="100000"/>
+              </a:lnSpc>
+              <a:spcBef>
+                <a:spcPts val="1001"/>
+              </a:spcBef>
+              <a:spcAft>
+                <a:spcPts val="1001"/>
+              </a:spcAft>
+              <a:tabLst>
+                <a:tab pos="0" algn="l"/>
+              </a:tabLst>
+            </a:pPr>
+            <a:r>
+              <a:rPr lang="pt-BR" sz="3200" spc="-1" dirty="0">
+                <a:solidFill>
+                  <a:srgbClr val="1F4E79"/>
+                </a:solidFill>
+              </a:rPr>
+              <a:t>Onde as propriedades:</a:t>
+            </a:r>
+          </a:p>
+          <a:p>
+            <a:pPr marL="457200" indent="-457200">
+              <a:lnSpc>
+                <a:spcPct val="100000"/>
+              </a:lnSpc>
+              <a:spcBef>
+                <a:spcPts val="1001"/>
+              </a:spcBef>
+              <a:spcAft>
+                <a:spcPts val="1001"/>
+              </a:spcAft>
+              <a:buFont typeface="Arial" panose="020B0604020202020204" pitchFamily="34" charset="0"/>
+              <a:buChar char="•"/>
+              <a:tabLst>
+                <a:tab pos="0" algn="l"/>
+              </a:tabLst>
+            </a:pPr>
+            <a:r>
+              <a:rPr lang="nn-NO" sz="3200" spc="-1" dirty="0">
+                <a:solidFill>
+                  <a:srgbClr val="1F4E79"/>
+                </a:solidFill>
+                <a:latin typeface="Courier New" panose="02070309020205020404" pitchFamily="49" charset="0"/>
+                <a:cs typeface="Courier New" panose="02070309020205020404" pitchFamily="49" charset="0"/>
+              </a:rPr>
+              <a:t>acceptedFiles</a:t>
+            </a:r>
+            <a:r>
+              <a:rPr lang="nn-NO" sz="3200" spc="-1" dirty="0">
+                <a:solidFill>
+                  <a:srgbClr val="1F4E79"/>
+                </a:solidFill>
+                <a:cs typeface="Courier New" panose="02070309020205020404" pitchFamily="49" charset="0"/>
+              </a:rPr>
+              <a:t>: indica o tipo de arquivo aceito;</a:t>
+            </a:r>
+          </a:p>
+          <a:p>
+            <a:pPr marL="457200" indent="-457200">
+              <a:lnSpc>
+                <a:spcPct val="100000"/>
+              </a:lnSpc>
+              <a:spcBef>
+                <a:spcPts val="1001"/>
+              </a:spcBef>
+              <a:spcAft>
+                <a:spcPts val="1001"/>
+              </a:spcAft>
+              <a:buFont typeface="Arial" panose="020B0604020202020204" pitchFamily="34" charset="0"/>
+              <a:buChar char="•"/>
+              <a:tabLst>
+                <a:tab pos="0" algn="l"/>
+              </a:tabLst>
+            </a:pPr>
+            <a:r>
+              <a:rPr lang="nn-NO" sz="3200" spc="-1" dirty="0">
+                <a:solidFill>
+                  <a:srgbClr val="1F4E79"/>
+                </a:solidFill>
+                <a:latin typeface="Courier New" panose="02070309020205020404" pitchFamily="49" charset="0"/>
+                <a:cs typeface="Courier New" panose="02070309020205020404" pitchFamily="49" charset="0"/>
+              </a:rPr>
+              <a:t>filesLimit</a:t>
+            </a:r>
+            <a:r>
+              <a:rPr lang="nn-NO" sz="3200" spc="-1" dirty="0">
+                <a:solidFill>
+                  <a:srgbClr val="1F4E79"/>
+                </a:solidFill>
+                <a:cs typeface="Courier New" panose="02070309020205020404" pitchFamily="49" charset="0"/>
+              </a:rPr>
+              <a:t> : indica a quantidade de arquivos aceita; e</a:t>
+            </a:r>
+            <a:endParaRPr lang="nn-NO" sz="3200" spc="-1" dirty="0">
+              <a:solidFill>
+                <a:srgbClr val="1F4E79"/>
+              </a:solidFill>
+              <a:latin typeface="Courier New" panose="02070309020205020404" pitchFamily="49" charset="0"/>
+              <a:cs typeface="Courier New" panose="02070309020205020404" pitchFamily="49" charset="0"/>
+            </a:endParaRPr>
+          </a:p>
+          <a:p>
+            <a:pPr marL="457200" indent="-457200">
+              <a:lnSpc>
+                <a:spcPct val="100000"/>
+              </a:lnSpc>
+              <a:spcBef>
+                <a:spcPts val="1001"/>
+              </a:spcBef>
+              <a:spcAft>
+                <a:spcPts val="1001"/>
+              </a:spcAft>
+              <a:buFont typeface="Arial" panose="020B0604020202020204" pitchFamily="34" charset="0"/>
+              <a:buChar char="•"/>
+              <a:tabLst>
+                <a:tab pos="0" algn="l"/>
+              </a:tabLst>
+            </a:pPr>
+            <a:r>
+              <a:rPr lang="nn-NO" sz="3200" spc="-1" dirty="0">
+                <a:solidFill>
+                  <a:srgbClr val="1F4E79"/>
+                </a:solidFill>
+                <a:latin typeface="Courier New" panose="02070309020205020404" pitchFamily="49" charset="0"/>
+                <a:cs typeface="Courier New" panose="02070309020205020404" pitchFamily="49" charset="0"/>
+              </a:rPr>
+              <a:t>maxFileSize</a:t>
+            </a:r>
+            <a:r>
+              <a:rPr lang="nn-NO" sz="3200" spc="-1" dirty="0">
+                <a:solidFill>
+                  <a:srgbClr val="1F4E79"/>
+                </a:solidFill>
+                <a:cs typeface="Courier New" panose="02070309020205020404" pitchFamily="49" charset="0"/>
+              </a:rPr>
+              <a:t> : indica o tamanho máximo de arquivo aceito, em bytes.</a:t>
+            </a:r>
+            <a:endParaRPr lang="pt-BR" sz="3200" spc="-1" dirty="0">
+              <a:solidFill>
+                <a:srgbClr val="1F4E79"/>
+              </a:solidFill>
+              <a:latin typeface="Courier New" panose="02070309020205020404" pitchFamily="49" charset="0"/>
+              <a:cs typeface="Courier New" panose="02070309020205020404" pitchFamily="49" charset="0"/>
+            </a:endParaRPr>
+          </a:p>
+        </p:txBody>
+      </p:sp>
+    </p:spTree>
+    <p:extLst>
+      <p:ext uri="{BB962C8B-B14F-4D97-AF65-F5344CB8AC3E}">
+        <p14:creationId xmlns:p14="http://schemas.microsoft.com/office/powerpoint/2010/main" val="2342313439"/>
+      </p:ext>
+    </p:extLst>
+  </p:cSld>
+  <p:clrMapOvr>
+    <a:masterClrMapping/>
+  </p:clrMapOvr>
+</p:sld>
+</file>
+
+<file path=ppt/slides/slide46.xml><?xml version="1.0" encoding="utf-8"?>
+<p:sld xmlns:a="http://schemas.openxmlformats.org/drawingml/2006/main" xmlns:r="http://schemas.openxmlformats.org/officeDocument/2006/relationships" xmlns:p="http://schemas.openxmlformats.org/presentationml/2006/main">
+  <p:cSld>
+    <p:spTree>
+      <p:nvGrpSpPr>
+        <p:cNvPr id="1" name=""/>
+        <p:cNvGrpSpPr/>
+        <p:nvPr/>
+      </p:nvGrpSpPr>
+      <p:grpSpPr>
+        <a:xfrm>
+          <a:off x="0" y="0"/>
+          <a:ext cx="0" cy="0"/>
+          <a:chOff x="0" y="0"/>
+          <a:chExt cx="0" cy="0"/>
+        </a:xfrm>
+      </p:grpSpPr>
+      <p:sp>
+        <p:nvSpPr>
+          <p:cNvPr id="98" name="CustomShape 1"/>
+          <p:cNvSpPr/>
+          <p:nvPr/>
+        </p:nvSpPr>
+        <p:spPr>
+          <a:xfrm>
+            <a:off x="0" y="224280"/>
+            <a:ext cx="12019320" cy="854640"/>
+          </a:xfrm>
+          <a:prstGeom prst="rect">
+            <a:avLst/>
+          </a:prstGeom>
+          <a:noFill/>
+          <a:ln>
+            <a:noFill/>
+          </a:ln>
+        </p:spPr>
+        <p:style>
+          <a:lnRef idx="0">
+            <a:scrgbClr r="0" g="0" b="0"/>
+          </a:lnRef>
+          <a:fillRef idx="0">
+            <a:scrgbClr r="0" g="0" b="0"/>
+          </a:fillRef>
+          <a:effectRef idx="0">
+            <a:scrgbClr r="0" g="0" b="0"/>
+          </a:effectRef>
+          <a:fontRef idx="minor"/>
+        </p:style>
+        <p:txBody>
+          <a:bodyPr lIns="90000" tIns="45000" rIns="90000" bIns="45000" anchor="ctr">
+            <a:noAutofit/>
+          </a:bodyPr>
+          <a:lstStyle/>
+          <a:p>
+            <a:pPr algn="ctr">
+              <a:lnSpc>
+                <a:spcPct val="90000"/>
+              </a:lnSpc>
+            </a:pPr>
+            <a:r>
+              <a:rPr lang="pt-BR" sz="5400" b="0" strike="noStrike" spc="-1" dirty="0">
+                <a:solidFill>
+                  <a:srgbClr val="1F4E79"/>
+                </a:solidFill>
+                <a:latin typeface="Arial"/>
+                <a:ea typeface="DejaVu Sans"/>
+              </a:rPr>
+              <a:t>Upload de arquivos</a:t>
+            </a:r>
+            <a:endParaRPr lang="pt-BR" sz="5400" b="0" strike="noStrike" spc="-1" dirty="0">
+              <a:latin typeface="Arial"/>
+            </a:endParaRPr>
+          </a:p>
+        </p:txBody>
+      </p:sp>
+      <p:sp>
+        <p:nvSpPr>
+          <p:cNvPr id="99" name="CustomShape 2"/>
+          <p:cNvSpPr/>
+          <p:nvPr/>
+        </p:nvSpPr>
+        <p:spPr>
+          <a:xfrm>
+            <a:off x="317520" y="1290960"/>
+            <a:ext cx="11701440" cy="4347360"/>
+          </a:xfrm>
+          <a:prstGeom prst="rect">
+            <a:avLst/>
+          </a:prstGeom>
+          <a:noFill/>
+          <a:ln>
+            <a:noFill/>
+          </a:ln>
+        </p:spPr>
+        <p:style>
+          <a:lnRef idx="0">
+            <a:scrgbClr r="0" g="0" b="0"/>
+          </a:lnRef>
+          <a:fillRef idx="0">
+            <a:scrgbClr r="0" g="0" b="0"/>
+          </a:fillRef>
+          <a:effectRef idx="0">
+            <a:scrgbClr r="0" g="0" b="0"/>
+          </a:effectRef>
+          <a:fontRef idx="minor"/>
+        </p:style>
+        <p:txBody>
+          <a:bodyPr lIns="90000" tIns="45000" rIns="90000" bIns="45000">
+            <a:normAutofit/>
+          </a:bodyPr>
+          <a:lstStyle/>
+          <a:p>
+            <a:pPr algn="ctr">
+              <a:lnSpc>
+                <a:spcPct val="100000"/>
+              </a:lnSpc>
+              <a:spcBef>
+                <a:spcPts val="1001"/>
+              </a:spcBef>
+              <a:spcAft>
+                <a:spcPts val="1001"/>
+              </a:spcAft>
+              <a:tabLst>
+                <a:tab pos="0" algn="l"/>
+              </a:tabLst>
+            </a:pPr>
+            <a:r>
+              <a:rPr lang="pt-BR" sz="3200" spc="-1" dirty="0">
+                <a:solidFill>
+                  <a:srgbClr val="1F4E79"/>
+                </a:solidFill>
+              </a:rPr>
+              <a:t>Os seguintes trechos de código também são necessários, no mesmo arquivo:</a:t>
+            </a:r>
+          </a:p>
+          <a:p>
+            <a:pPr>
+              <a:lnSpc>
+                <a:spcPct val="100000"/>
+              </a:lnSpc>
+              <a:spcBef>
+                <a:spcPts val="1001"/>
+              </a:spcBef>
+              <a:spcAft>
+                <a:spcPts val="1001"/>
+              </a:spcAft>
+              <a:tabLst>
+                <a:tab pos="0" algn="l"/>
+              </a:tabLst>
+            </a:pPr>
+            <a:r>
+              <a:rPr lang="pt-BR" sz="3200" spc="-1" dirty="0" err="1">
+                <a:solidFill>
+                  <a:srgbClr val="1F4E79"/>
+                </a:solidFill>
+                <a:latin typeface="Courier New" panose="02070309020205020404" pitchFamily="49" charset="0"/>
+                <a:cs typeface="Courier New" panose="02070309020205020404" pitchFamily="49" charset="0"/>
+              </a:rPr>
+              <a:t>import</a:t>
+            </a:r>
+            <a:r>
+              <a:rPr lang="pt-BR" sz="3200" spc="-1" dirty="0">
+                <a:solidFill>
+                  <a:srgbClr val="1F4E79"/>
+                </a:solidFill>
+                <a:latin typeface="Courier New" panose="02070309020205020404" pitchFamily="49" charset="0"/>
+                <a:cs typeface="Courier New" panose="02070309020205020404" pitchFamily="49" charset="0"/>
+              </a:rPr>
+              <a:t> { </a:t>
+            </a:r>
+            <a:r>
+              <a:rPr lang="pt-BR" sz="3200" spc="-1" dirty="0" err="1">
+                <a:solidFill>
+                  <a:srgbClr val="1F4E79"/>
+                </a:solidFill>
+                <a:latin typeface="Courier New" panose="02070309020205020404" pitchFamily="49" charset="0"/>
+                <a:cs typeface="Courier New" panose="02070309020205020404" pitchFamily="49" charset="0"/>
+              </a:rPr>
+              <a:t>DropzoneArea</a:t>
+            </a:r>
+            <a:r>
+              <a:rPr lang="pt-BR" sz="3200" spc="-1" dirty="0">
+                <a:solidFill>
+                  <a:srgbClr val="1F4E79"/>
+                </a:solidFill>
+                <a:latin typeface="Courier New" panose="02070309020205020404" pitchFamily="49" charset="0"/>
+                <a:cs typeface="Courier New" panose="02070309020205020404" pitchFamily="49" charset="0"/>
+              </a:rPr>
+              <a:t> } </a:t>
+            </a:r>
+            <a:r>
+              <a:rPr lang="pt-BR" sz="3200" spc="-1" dirty="0" err="1">
+                <a:solidFill>
+                  <a:srgbClr val="1F4E79"/>
+                </a:solidFill>
+                <a:latin typeface="Courier New" panose="02070309020205020404" pitchFamily="49" charset="0"/>
+                <a:cs typeface="Courier New" panose="02070309020205020404" pitchFamily="49" charset="0"/>
+              </a:rPr>
+              <a:t>from</a:t>
+            </a:r>
+            <a:r>
+              <a:rPr lang="pt-BR" sz="3200" spc="-1" dirty="0">
+                <a:solidFill>
+                  <a:srgbClr val="1F4E79"/>
+                </a:solidFill>
+                <a:latin typeface="Courier New" panose="02070309020205020404" pitchFamily="49" charset="0"/>
+                <a:cs typeface="Courier New" panose="02070309020205020404" pitchFamily="49" charset="0"/>
+              </a:rPr>
+              <a:t> 'material-ui-</a:t>
+            </a:r>
+            <a:r>
+              <a:rPr lang="pt-BR" sz="3200" spc="-1" dirty="0" err="1">
+                <a:solidFill>
+                  <a:srgbClr val="1F4E79"/>
+                </a:solidFill>
+                <a:latin typeface="Courier New" panose="02070309020205020404" pitchFamily="49" charset="0"/>
+                <a:cs typeface="Courier New" panose="02070309020205020404" pitchFamily="49" charset="0"/>
+              </a:rPr>
+              <a:t>dropzone</a:t>
+            </a:r>
+            <a:r>
+              <a:rPr lang="pt-BR" sz="3200" spc="-1" dirty="0">
+                <a:solidFill>
+                  <a:srgbClr val="1F4E79"/>
+                </a:solidFill>
+                <a:latin typeface="Courier New" panose="02070309020205020404" pitchFamily="49" charset="0"/>
+                <a:cs typeface="Courier New" panose="02070309020205020404" pitchFamily="49" charset="0"/>
+              </a:rPr>
+              <a:t>’;</a:t>
+            </a:r>
+          </a:p>
+          <a:p>
+            <a:pPr>
+              <a:lnSpc>
+                <a:spcPct val="100000"/>
+              </a:lnSpc>
+              <a:spcBef>
+                <a:spcPts val="1001"/>
+              </a:spcBef>
+              <a:spcAft>
+                <a:spcPts val="1001"/>
+              </a:spcAft>
+              <a:tabLst>
+                <a:tab pos="0" algn="l"/>
+              </a:tabLst>
+            </a:pPr>
+            <a:r>
+              <a:rPr lang="pt-BR" sz="3200" spc="-1" dirty="0">
+                <a:solidFill>
+                  <a:srgbClr val="1F4E79"/>
+                </a:solidFill>
+                <a:latin typeface="Courier New" panose="02070309020205020404" pitchFamily="49" charset="0"/>
+                <a:cs typeface="Courier New" panose="02070309020205020404" pitchFamily="49" charset="0"/>
+              </a:rPr>
+              <a:t>...</a:t>
+            </a:r>
+          </a:p>
+          <a:p>
+            <a:pPr>
+              <a:lnSpc>
+                <a:spcPct val="100000"/>
+              </a:lnSpc>
+              <a:spcBef>
+                <a:spcPts val="1001"/>
+              </a:spcBef>
+              <a:spcAft>
+                <a:spcPts val="1001"/>
+              </a:spcAft>
+              <a:tabLst>
+                <a:tab pos="0" algn="l"/>
+              </a:tabLst>
+            </a:pPr>
+            <a:r>
+              <a:rPr lang="pt-BR" sz="3200" spc="-1" dirty="0" err="1">
+                <a:solidFill>
+                  <a:srgbClr val="1F4E79"/>
+                </a:solidFill>
+                <a:latin typeface="Courier New" panose="02070309020205020404" pitchFamily="49" charset="0"/>
+                <a:cs typeface="Courier New" panose="02070309020205020404" pitchFamily="49" charset="0"/>
+              </a:rPr>
+              <a:t>const</a:t>
+            </a:r>
+            <a:r>
+              <a:rPr lang="pt-BR" sz="3200" spc="-1" dirty="0">
+                <a:solidFill>
+                  <a:srgbClr val="1F4E79"/>
+                </a:solidFill>
+                <a:latin typeface="Courier New" panose="02070309020205020404" pitchFamily="49" charset="0"/>
+                <a:cs typeface="Courier New" panose="02070309020205020404" pitchFamily="49" charset="0"/>
+              </a:rPr>
+              <a:t> [file, </a:t>
+            </a:r>
+            <a:r>
+              <a:rPr lang="pt-BR" sz="3200" spc="-1" dirty="0" err="1">
+                <a:solidFill>
+                  <a:srgbClr val="1F4E79"/>
+                </a:solidFill>
+                <a:latin typeface="Courier New" panose="02070309020205020404" pitchFamily="49" charset="0"/>
+                <a:cs typeface="Courier New" panose="02070309020205020404" pitchFamily="49" charset="0"/>
+              </a:rPr>
+              <a:t>setFile</a:t>
+            </a:r>
+            <a:r>
+              <a:rPr lang="pt-BR" sz="3200" spc="-1" dirty="0">
+                <a:solidFill>
+                  <a:srgbClr val="1F4E79"/>
+                </a:solidFill>
+                <a:latin typeface="Courier New" panose="02070309020205020404" pitchFamily="49" charset="0"/>
+                <a:cs typeface="Courier New" panose="02070309020205020404" pitchFamily="49" charset="0"/>
+              </a:rPr>
+              <a:t>] = </a:t>
+            </a:r>
+            <a:r>
+              <a:rPr lang="pt-BR" sz="3200" spc="-1" dirty="0" err="1">
+                <a:solidFill>
+                  <a:srgbClr val="1F4E79"/>
+                </a:solidFill>
+                <a:latin typeface="Courier New" panose="02070309020205020404" pitchFamily="49" charset="0"/>
+                <a:cs typeface="Courier New" panose="02070309020205020404" pitchFamily="49" charset="0"/>
+              </a:rPr>
+              <a:t>useState</a:t>
+            </a:r>
+            <a:r>
+              <a:rPr lang="pt-BR" sz="3200" spc="-1" dirty="0">
+                <a:solidFill>
+                  <a:srgbClr val="1F4E79"/>
+                </a:solidFill>
+                <a:latin typeface="Courier New" panose="02070309020205020404" pitchFamily="49" charset="0"/>
+                <a:cs typeface="Courier New" panose="02070309020205020404" pitchFamily="49" charset="0"/>
+              </a:rPr>
+              <a:t>&lt;File&gt;();</a:t>
+            </a:r>
+          </a:p>
+          <a:p>
+            <a:pPr>
+              <a:lnSpc>
+                <a:spcPct val="100000"/>
+              </a:lnSpc>
+              <a:spcBef>
+                <a:spcPts val="1001"/>
+              </a:spcBef>
+              <a:spcAft>
+                <a:spcPts val="1001"/>
+              </a:spcAft>
+              <a:tabLst>
+                <a:tab pos="0" algn="l"/>
+              </a:tabLst>
+            </a:pPr>
+            <a:endParaRPr lang="pt-BR" sz="3200" spc="-1" dirty="0">
+              <a:solidFill>
+                <a:srgbClr val="1F4E79"/>
+              </a:solidFill>
+              <a:latin typeface="Courier New" panose="02070309020205020404" pitchFamily="49" charset="0"/>
+              <a:cs typeface="Courier New" panose="02070309020205020404" pitchFamily="49" charset="0"/>
+            </a:endParaRPr>
+          </a:p>
+        </p:txBody>
+      </p:sp>
+    </p:spTree>
+    <p:extLst>
+      <p:ext uri="{BB962C8B-B14F-4D97-AF65-F5344CB8AC3E}">
+        <p14:creationId xmlns:p14="http://schemas.microsoft.com/office/powerpoint/2010/main" val="3596590422"/>
+      </p:ext>
+    </p:extLst>
+  </p:cSld>
+  <p:clrMapOvr>
+    <a:masterClrMapping/>
+  </p:clrMapOvr>
+</p:sld>
+</file>
+
+<file path=ppt/slides/slide47.xml><?xml version="1.0" encoding="utf-8"?>
+<p:sld xmlns:a="http://schemas.openxmlformats.org/drawingml/2006/main" xmlns:r="http://schemas.openxmlformats.org/officeDocument/2006/relationships" xmlns:p="http://schemas.openxmlformats.org/presentationml/2006/main">
+  <p:cSld>
+    <p:spTree>
+      <p:nvGrpSpPr>
+        <p:cNvPr id="1" name=""/>
+        <p:cNvGrpSpPr/>
+        <p:nvPr/>
+      </p:nvGrpSpPr>
+      <p:grpSpPr>
+        <a:xfrm>
+          <a:off x="0" y="0"/>
+          <a:ext cx="0" cy="0"/>
+          <a:chOff x="0" y="0"/>
+          <a:chExt cx="0" cy="0"/>
+        </a:xfrm>
+      </p:grpSpPr>
+      <p:sp>
+        <p:nvSpPr>
+          <p:cNvPr id="98" name="CustomShape 1"/>
+          <p:cNvSpPr/>
+          <p:nvPr/>
+        </p:nvSpPr>
+        <p:spPr>
+          <a:xfrm>
+            <a:off x="0" y="224280"/>
+            <a:ext cx="12019320" cy="854640"/>
+          </a:xfrm>
+          <a:prstGeom prst="rect">
+            <a:avLst/>
+          </a:prstGeom>
+          <a:noFill/>
+          <a:ln>
+            <a:noFill/>
+          </a:ln>
+        </p:spPr>
+        <p:style>
+          <a:lnRef idx="0">
+            <a:scrgbClr r="0" g="0" b="0"/>
+          </a:lnRef>
+          <a:fillRef idx="0">
+            <a:scrgbClr r="0" g="0" b="0"/>
+          </a:fillRef>
+          <a:effectRef idx="0">
+            <a:scrgbClr r="0" g="0" b="0"/>
+          </a:effectRef>
+          <a:fontRef idx="minor"/>
+        </p:style>
+        <p:txBody>
+          <a:bodyPr lIns="90000" tIns="45000" rIns="90000" bIns="45000" anchor="ctr">
+            <a:noAutofit/>
+          </a:bodyPr>
+          <a:lstStyle/>
+          <a:p>
+            <a:pPr algn="ctr">
+              <a:lnSpc>
+                <a:spcPct val="90000"/>
+              </a:lnSpc>
+            </a:pPr>
+            <a:r>
+              <a:rPr lang="pt-BR" sz="5400" b="0" strike="noStrike" spc="-1" dirty="0">
+                <a:solidFill>
+                  <a:srgbClr val="1F4E79"/>
+                </a:solidFill>
+                <a:latin typeface="Arial"/>
+                <a:ea typeface="DejaVu Sans"/>
+              </a:rPr>
+              <a:t>Upload de arquivos</a:t>
+            </a:r>
+            <a:endParaRPr lang="pt-BR" sz="5400" b="0" strike="noStrike" spc="-1" dirty="0">
+              <a:latin typeface="Arial"/>
+            </a:endParaRPr>
+          </a:p>
+        </p:txBody>
+      </p:sp>
+      <p:sp>
+        <p:nvSpPr>
+          <p:cNvPr id="99" name="CustomShape 2"/>
+          <p:cNvSpPr/>
+          <p:nvPr/>
+        </p:nvSpPr>
+        <p:spPr>
+          <a:xfrm>
+            <a:off x="317520" y="1290960"/>
+            <a:ext cx="11701440" cy="4347360"/>
+          </a:xfrm>
+          <a:prstGeom prst="rect">
+            <a:avLst/>
+          </a:prstGeom>
+          <a:noFill/>
+          <a:ln>
+            <a:noFill/>
+          </a:ln>
+        </p:spPr>
+        <p:style>
+          <a:lnRef idx="0">
+            <a:scrgbClr r="0" g="0" b="0"/>
+          </a:lnRef>
+          <a:fillRef idx="0">
+            <a:scrgbClr r="0" g="0" b="0"/>
+          </a:fillRef>
+          <a:effectRef idx="0">
+            <a:scrgbClr r="0" g="0" b="0"/>
+          </a:effectRef>
+          <a:fontRef idx="minor"/>
+        </p:style>
+        <p:txBody>
+          <a:bodyPr lIns="90000" tIns="45000" rIns="90000" bIns="45000">
+            <a:normAutofit fontScale="55000" lnSpcReduction="20000"/>
+          </a:bodyPr>
+          <a:lstStyle/>
+          <a:p>
+            <a:pPr algn="ctr">
+              <a:lnSpc>
+                <a:spcPct val="100000"/>
+              </a:lnSpc>
+              <a:spcBef>
+                <a:spcPts val="1001"/>
+              </a:spcBef>
+              <a:spcAft>
+                <a:spcPts val="1001"/>
+              </a:spcAft>
+              <a:tabLst>
+                <a:tab pos="0" algn="l"/>
+              </a:tabLst>
+            </a:pPr>
+            <a:r>
+              <a:rPr lang="pt-BR" sz="3200" spc="-1" dirty="0">
+                <a:solidFill>
+                  <a:srgbClr val="1F4E79"/>
+                </a:solidFill>
+              </a:rPr>
+              <a:t>Exemplo de submissão de imagem para um item específico (por ID):</a:t>
+            </a:r>
+          </a:p>
+          <a:p>
+            <a:pPr>
+              <a:lnSpc>
+                <a:spcPct val="100000"/>
+              </a:lnSpc>
+              <a:spcBef>
+                <a:spcPts val="1001"/>
+              </a:spcBef>
+              <a:spcAft>
+                <a:spcPts val="1001"/>
+              </a:spcAft>
+              <a:tabLst>
+                <a:tab pos="0" algn="l"/>
+              </a:tabLst>
+            </a:pPr>
+            <a:r>
+              <a:rPr lang="pt-BR" sz="3200" spc="-1" dirty="0" err="1">
+                <a:solidFill>
+                  <a:srgbClr val="1F4E79"/>
+                </a:solidFill>
+                <a:latin typeface="Courier New" panose="02070309020205020404" pitchFamily="49" charset="0"/>
+                <a:cs typeface="Courier New" panose="02070309020205020404" pitchFamily="49" charset="0"/>
+              </a:rPr>
+              <a:t>const</a:t>
+            </a:r>
+            <a:r>
+              <a:rPr lang="pt-BR" sz="3200" spc="-1" dirty="0">
+                <a:solidFill>
+                  <a:srgbClr val="1F4E79"/>
+                </a:solidFill>
+                <a:latin typeface="Courier New" panose="02070309020205020404" pitchFamily="49" charset="0"/>
+                <a:cs typeface="Courier New" panose="02070309020205020404" pitchFamily="49" charset="0"/>
+              </a:rPr>
+              <a:t> </a:t>
+            </a:r>
+            <a:r>
+              <a:rPr lang="pt-BR" sz="3200" spc="-1" dirty="0" err="1">
+                <a:solidFill>
+                  <a:srgbClr val="1F4E79"/>
+                </a:solidFill>
+                <a:latin typeface="Courier New" panose="02070309020205020404" pitchFamily="49" charset="0"/>
+                <a:cs typeface="Courier New" panose="02070309020205020404" pitchFamily="49" charset="0"/>
+              </a:rPr>
+              <a:t>updateAvatar</a:t>
+            </a:r>
+            <a:r>
+              <a:rPr lang="pt-BR" sz="3200" spc="-1" dirty="0">
+                <a:solidFill>
+                  <a:srgbClr val="1F4E79"/>
+                </a:solidFill>
+                <a:latin typeface="Courier New" panose="02070309020205020404" pitchFamily="49" charset="0"/>
+                <a:cs typeface="Courier New" panose="02070309020205020404" pitchFamily="49" charset="0"/>
+              </a:rPr>
+              <a:t> = </a:t>
+            </a:r>
+            <a:r>
+              <a:rPr lang="pt-BR" sz="3200" spc="-1" dirty="0" err="1">
+                <a:solidFill>
+                  <a:srgbClr val="1F4E79"/>
+                </a:solidFill>
+                <a:latin typeface="Courier New" panose="02070309020205020404" pitchFamily="49" charset="0"/>
+                <a:cs typeface="Courier New" panose="02070309020205020404" pitchFamily="49" charset="0"/>
+              </a:rPr>
+              <a:t>useCallback</a:t>
+            </a:r>
+            <a:r>
+              <a:rPr lang="pt-BR" sz="3200" spc="-1" dirty="0">
+                <a:solidFill>
+                  <a:srgbClr val="1F4E79"/>
+                </a:solidFill>
+                <a:latin typeface="Courier New" panose="02070309020205020404" pitchFamily="49" charset="0"/>
+                <a:cs typeface="Courier New" panose="02070309020205020404" pitchFamily="49" charset="0"/>
+              </a:rPr>
+              <a:t>(</a:t>
+            </a:r>
+            <a:r>
+              <a:rPr lang="pt-BR" sz="3200" spc="-1" dirty="0" err="1">
+                <a:solidFill>
+                  <a:srgbClr val="1F4E79"/>
+                </a:solidFill>
+                <a:latin typeface="Courier New" panose="02070309020205020404" pitchFamily="49" charset="0"/>
+                <a:cs typeface="Courier New" panose="02070309020205020404" pitchFamily="49" charset="0"/>
+              </a:rPr>
+              <a:t>async</a:t>
+            </a:r>
+            <a:r>
+              <a:rPr lang="pt-BR" sz="3200" spc="-1" dirty="0">
+                <a:solidFill>
+                  <a:srgbClr val="1F4E79"/>
+                </a:solidFill>
+                <a:latin typeface="Courier New" panose="02070309020205020404" pitchFamily="49" charset="0"/>
+                <a:cs typeface="Courier New" panose="02070309020205020404" pitchFamily="49" charset="0"/>
+              </a:rPr>
+              <a:t> (id: </a:t>
+            </a:r>
+            <a:r>
+              <a:rPr lang="pt-BR" sz="3200" spc="-1" dirty="0" err="1">
+                <a:solidFill>
+                  <a:srgbClr val="1F4E79"/>
+                </a:solidFill>
+                <a:latin typeface="Courier New" panose="02070309020205020404" pitchFamily="49" charset="0"/>
+                <a:cs typeface="Courier New" panose="02070309020205020404" pitchFamily="49" charset="0"/>
+              </a:rPr>
+              <a:t>number</a:t>
+            </a:r>
+            <a:r>
+              <a:rPr lang="pt-BR" sz="3200" spc="-1" dirty="0">
+                <a:solidFill>
+                  <a:srgbClr val="1F4E79"/>
+                </a:solidFill>
+                <a:latin typeface="Courier New" panose="02070309020205020404" pitchFamily="49" charset="0"/>
+                <a:cs typeface="Courier New" panose="02070309020205020404" pitchFamily="49" charset="0"/>
+              </a:rPr>
+              <a:t>, </a:t>
+            </a:r>
+            <a:r>
+              <a:rPr lang="pt-BR" sz="3200" spc="-1" dirty="0" err="1">
+                <a:solidFill>
+                  <a:srgbClr val="1F4E79"/>
+                </a:solidFill>
+                <a:latin typeface="Courier New" panose="02070309020205020404" pitchFamily="49" charset="0"/>
+                <a:cs typeface="Courier New" panose="02070309020205020404" pitchFamily="49" charset="0"/>
+              </a:rPr>
+              <a:t>imageUri</a:t>
+            </a:r>
+            <a:r>
+              <a:rPr lang="pt-BR" sz="3200" spc="-1" dirty="0">
+                <a:solidFill>
+                  <a:srgbClr val="1F4E79"/>
+                </a:solidFill>
+                <a:latin typeface="Courier New" panose="02070309020205020404" pitchFamily="49" charset="0"/>
+                <a:cs typeface="Courier New" panose="02070309020205020404" pitchFamily="49" charset="0"/>
+              </a:rPr>
+              <a:t>) =&gt; {</a:t>
+            </a:r>
+          </a:p>
+          <a:p>
+            <a:pPr>
+              <a:lnSpc>
+                <a:spcPct val="100000"/>
+              </a:lnSpc>
+              <a:spcBef>
+                <a:spcPts val="1001"/>
+              </a:spcBef>
+              <a:spcAft>
+                <a:spcPts val="1001"/>
+              </a:spcAft>
+              <a:tabLst>
+                <a:tab pos="0" algn="l"/>
+              </a:tabLst>
+            </a:pPr>
+            <a:r>
+              <a:rPr lang="pt-BR" sz="3200" spc="-1" dirty="0">
+                <a:solidFill>
+                  <a:srgbClr val="1F4E79"/>
+                </a:solidFill>
+                <a:latin typeface="Courier New" panose="02070309020205020404" pitchFamily="49" charset="0"/>
+                <a:cs typeface="Courier New" panose="02070309020205020404" pitchFamily="49" charset="0"/>
+              </a:rPr>
+              <a:t>        </a:t>
+            </a:r>
+            <a:r>
+              <a:rPr lang="pt-BR" sz="3200" spc="-1" dirty="0" err="1">
+                <a:solidFill>
+                  <a:srgbClr val="1F4E79"/>
+                </a:solidFill>
+                <a:latin typeface="Courier New" panose="02070309020205020404" pitchFamily="49" charset="0"/>
+                <a:cs typeface="Courier New" panose="02070309020205020404" pitchFamily="49" charset="0"/>
+              </a:rPr>
+              <a:t>try</a:t>
+            </a:r>
+            <a:r>
+              <a:rPr lang="pt-BR" sz="3200" spc="-1" dirty="0">
+                <a:solidFill>
+                  <a:srgbClr val="1F4E79"/>
+                </a:solidFill>
+                <a:latin typeface="Courier New" panose="02070309020205020404" pitchFamily="49" charset="0"/>
+                <a:cs typeface="Courier New" panose="02070309020205020404" pitchFamily="49" charset="0"/>
+              </a:rPr>
+              <a:t> {</a:t>
+            </a:r>
+          </a:p>
+          <a:p>
+            <a:pPr>
+              <a:lnSpc>
+                <a:spcPct val="100000"/>
+              </a:lnSpc>
+              <a:spcBef>
+                <a:spcPts val="1001"/>
+              </a:spcBef>
+              <a:spcAft>
+                <a:spcPts val="1001"/>
+              </a:spcAft>
+              <a:tabLst>
+                <a:tab pos="0" algn="l"/>
+              </a:tabLst>
+            </a:pPr>
+            <a:r>
+              <a:rPr lang="pt-BR" sz="3200" spc="-1" dirty="0">
+                <a:solidFill>
+                  <a:srgbClr val="1F4E79"/>
+                </a:solidFill>
+                <a:latin typeface="Courier New" panose="02070309020205020404" pitchFamily="49" charset="0"/>
+                <a:cs typeface="Courier New" panose="02070309020205020404" pitchFamily="49" charset="0"/>
+              </a:rPr>
+              <a:t>            </a:t>
+            </a:r>
+            <a:r>
+              <a:rPr lang="pt-BR" sz="3200" spc="-1" dirty="0" err="1">
+                <a:solidFill>
+                  <a:srgbClr val="1F4E79"/>
+                </a:solidFill>
+                <a:latin typeface="Courier New" panose="02070309020205020404" pitchFamily="49" charset="0"/>
+                <a:cs typeface="Courier New" panose="02070309020205020404" pitchFamily="49" charset="0"/>
+              </a:rPr>
+              <a:t>const</a:t>
+            </a:r>
+            <a:r>
+              <a:rPr lang="pt-BR" sz="3200" spc="-1" dirty="0">
+                <a:solidFill>
+                  <a:srgbClr val="1F4E79"/>
+                </a:solidFill>
+                <a:latin typeface="Courier New" panose="02070309020205020404" pitchFamily="49" charset="0"/>
+                <a:cs typeface="Courier New" panose="02070309020205020404" pitchFamily="49" charset="0"/>
+              </a:rPr>
+              <a:t> </a:t>
+            </a:r>
+            <a:r>
+              <a:rPr lang="pt-BR" sz="3200" spc="-1" dirty="0" err="1">
+                <a:solidFill>
+                  <a:srgbClr val="1F4E79"/>
+                </a:solidFill>
+                <a:latin typeface="Courier New" panose="02070309020205020404" pitchFamily="49" charset="0"/>
+                <a:cs typeface="Courier New" panose="02070309020205020404" pitchFamily="49" charset="0"/>
+              </a:rPr>
+              <a:t>body</a:t>
+            </a:r>
+            <a:r>
+              <a:rPr lang="pt-BR" sz="3200" spc="-1" dirty="0">
+                <a:solidFill>
+                  <a:srgbClr val="1F4E79"/>
+                </a:solidFill>
+                <a:latin typeface="Courier New" panose="02070309020205020404" pitchFamily="49" charset="0"/>
+                <a:cs typeface="Courier New" panose="02070309020205020404" pitchFamily="49" charset="0"/>
+              </a:rPr>
+              <a:t> = new </a:t>
+            </a:r>
+            <a:r>
+              <a:rPr lang="pt-BR" sz="3200" spc="-1" dirty="0" err="1">
+                <a:solidFill>
+                  <a:srgbClr val="1F4E79"/>
+                </a:solidFill>
+                <a:latin typeface="Courier New" panose="02070309020205020404" pitchFamily="49" charset="0"/>
+                <a:cs typeface="Courier New" panose="02070309020205020404" pitchFamily="49" charset="0"/>
+              </a:rPr>
+              <a:t>FormData</a:t>
+            </a:r>
+            <a:r>
+              <a:rPr lang="pt-BR" sz="3200" spc="-1" dirty="0">
+                <a:solidFill>
+                  <a:srgbClr val="1F4E79"/>
+                </a:solidFill>
+                <a:latin typeface="Courier New" panose="02070309020205020404" pitchFamily="49" charset="0"/>
+                <a:cs typeface="Courier New" panose="02070309020205020404" pitchFamily="49" charset="0"/>
+              </a:rPr>
+              <a:t>()</a:t>
+            </a:r>
+          </a:p>
+          <a:p>
+            <a:pPr>
+              <a:lnSpc>
+                <a:spcPct val="100000"/>
+              </a:lnSpc>
+              <a:spcBef>
+                <a:spcPts val="1001"/>
+              </a:spcBef>
+              <a:spcAft>
+                <a:spcPts val="1001"/>
+              </a:spcAft>
+              <a:tabLst>
+                <a:tab pos="0" algn="l"/>
+              </a:tabLst>
+            </a:pPr>
+            <a:r>
+              <a:rPr lang="pt-BR" sz="3200" spc="-1" dirty="0">
+                <a:solidFill>
+                  <a:srgbClr val="1F4E79"/>
+                </a:solidFill>
+                <a:latin typeface="Courier New" panose="02070309020205020404" pitchFamily="49" charset="0"/>
+                <a:cs typeface="Courier New" panose="02070309020205020404" pitchFamily="49" charset="0"/>
+              </a:rPr>
+              <a:t>            </a:t>
+            </a:r>
+            <a:r>
+              <a:rPr lang="pt-BR" sz="3200" spc="-1" dirty="0" err="1">
+                <a:solidFill>
+                  <a:srgbClr val="1F4E79"/>
+                </a:solidFill>
+                <a:latin typeface="Courier New" panose="02070309020205020404" pitchFamily="49" charset="0"/>
+                <a:cs typeface="Courier New" panose="02070309020205020404" pitchFamily="49" charset="0"/>
+              </a:rPr>
+              <a:t>body.append</a:t>
+            </a:r>
+            <a:r>
+              <a:rPr lang="pt-BR" sz="3200" spc="-1" dirty="0">
+                <a:solidFill>
+                  <a:srgbClr val="1F4E79"/>
+                </a:solidFill>
+                <a:latin typeface="Courier New" panose="02070309020205020404" pitchFamily="49" charset="0"/>
+                <a:cs typeface="Courier New" panose="02070309020205020404" pitchFamily="49" charset="0"/>
+              </a:rPr>
+              <a:t>('anexo', </a:t>
+            </a:r>
+            <a:r>
+              <a:rPr lang="pt-BR" sz="3200" spc="-1" dirty="0" err="1">
+                <a:solidFill>
+                  <a:srgbClr val="1F4E79"/>
+                </a:solidFill>
+                <a:latin typeface="Courier New" panose="02070309020205020404" pitchFamily="49" charset="0"/>
+                <a:cs typeface="Courier New" panose="02070309020205020404" pitchFamily="49" charset="0"/>
+              </a:rPr>
+              <a:t>imageUri</a:t>
+            </a:r>
+            <a:r>
+              <a:rPr lang="pt-BR" sz="3200" spc="-1" dirty="0">
+                <a:solidFill>
+                  <a:srgbClr val="1F4E79"/>
+                </a:solidFill>
+                <a:latin typeface="Courier New" panose="02070309020205020404" pitchFamily="49" charset="0"/>
+                <a:cs typeface="Courier New" panose="02070309020205020404" pitchFamily="49" charset="0"/>
+              </a:rPr>
+              <a:t>)      </a:t>
+            </a:r>
+          </a:p>
+          <a:p>
+            <a:pPr>
+              <a:lnSpc>
+                <a:spcPct val="100000"/>
+              </a:lnSpc>
+              <a:spcBef>
+                <a:spcPts val="1001"/>
+              </a:spcBef>
+              <a:spcAft>
+                <a:spcPts val="1001"/>
+              </a:spcAft>
+              <a:tabLst>
+                <a:tab pos="0" algn="l"/>
+              </a:tabLst>
+            </a:pPr>
+            <a:r>
+              <a:rPr lang="pt-BR" sz="3200" spc="-1" dirty="0">
+                <a:solidFill>
+                  <a:srgbClr val="1F4E79"/>
+                </a:solidFill>
+                <a:latin typeface="Courier New" panose="02070309020205020404" pitchFamily="49" charset="0"/>
+                <a:cs typeface="Courier New" panose="02070309020205020404" pitchFamily="49" charset="0"/>
+              </a:rPr>
+              <a:t>            </a:t>
+            </a:r>
+            <a:r>
+              <a:rPr lang="pt-BR" sz="3200" spc="-1" dirty="0" err="1">
+                <a:solidFill>
+                  <a:srgbClr val="1F4E79"/>
+                </a:solidFill>
+                <a:latin typeface="Courier New" panose="02070309020205020404" pitchFamily="49" charset="0"/>
+                <a:cs typeface="Courier New" panose="02070309020205020404" pitchFamily="49" charset="0"/>
+              </a:rPr>
+              <a:t>const</a:t>
+            </a:r>
+            <a:r>
+              <a:rPr lang="pt-BR" sz="3200" spc="-1" dirty="0">
+                <a:solidFill>
+                  <a:srgbClr val="1F4E79"/>
+                </a:solidFill>
+                <a:latin typeface="Courier New" panose="02070309020205020404" pitchFamily="49" charset="0"/>
+                <a:cs typeface="Courier New" panose="02070309020205020404" pitchFamily="49" charset="0"/>
+              </a:rPr>
+              <a:t> </a:t>
+            </a:r>
+            <a:r>
+              <a:rPr lang="pt-BR" sz="3200" spc="-1" dirty="0" err="1">
+                <a:solidFill>
+                  <a:srgbClr val="1F4E79"/>
+                </a:solidFill>
+                <a:latin typeface="Courier New" panose="02070309020205020404" pitchFamily="49" charset="0"/>
+                <a:cs typeface="Courier New" panose="02070309020205020404" pitchFamily="49" charset="0"/>
+              </a:rPr>
+              <a:t>headers</a:t>
+            </a:r>
+            <a:r>
+              <a:rPr lang="pt-BR" sz="3200" spc="-1" dirty="0">
+                <a:solidFill>
+                  <a:srgbClr val="1F4E79"/>
+                </a:solidFill>
+                <a:latin typeface="Courier New" panose="02070309020205020404" pitchFamily="49" charset="0"/>
+                <a:cs typeface="Courier New" panose="02070309020205020404" pitchFamily="49" charset="0"/>
+              </a:rPr>
+              <a:t> = { '</a:t>
+            </a:r>
+            <a:r>
+              <a:rPr lang="pt-BR" sz="3200" spc="-1" dirty="0" err="1">
+                <a:solidFill>
+                  <a:srgbClr val="1F4E79"/>
+                </a:solidFill>
+                <a:latin typeface="Courier New" panose="02070309020205020404" pitchFamily="49" charset="0"/>
+                <a:cs typeface="Courier New" panose="02070309020205020404" pitchFamily="49" charset="0"/>
+              </a:rPr>
+              <a:t>content-type</a:t>
+            </a:r>
+            <a:r>
+              <a:rPr lang="pt-BR" sz="3200" spc="-1" dirty="0">
+                <a:solidFill>
+                  <a:srgbClr val="1F4E79"/>
+                </a:solidFill>
+                <a:latin typeface="Courier New" panose="02070309020205020404" pitchFamily="49" charset="0"/>
+                <a:cs typeface="Courier New" panose="02070309020205020404" pitchFamily="49" charset="0"/>
+              </a:rPr>
+              <a:t>': '</a:t>
+            </a:r>
+            <a:r>
+              <a:rPr lang="pt-BR" sz="3200" spc="-1" dirty="0" err="1">
+                <a:solidFill>
+                  <a:srgbClr val="1F4E79"/>
+                </a:solidFill>
+                <a:latin typeface="Courier New" panose="02070309020205020404" pitchFamily="49" charset="0"/>
+                <a:cs typeface="Courier New" panose="02070309020205020404" pitchFamily="49" charset="0"/>
+              </a:rPr>
+              <a:t>multipart</a:t>
+            </a:r>
+            <a:r>
+              <a:rPr lang="pt-BR" sz="3200" spc="-1" dirty="0">
+                <a:solidFill>
+                  <a:srgbClr val="1F4E79"/>
+                </a:solidFill>
+                <a:latin typeface="Courier New" panose="02070309020205020404" pitchFamily="49" charset="0"/>
+                <a:cs typeface="Courier New" panose="02070309020205020404" pitchFamily="49" charset="0"/>
+              </a:rPr>
+              <a:t>/</a:t>
+            </a:r>
+            <a:r>
+              <a:rPr lang="pt-BR" sz="3200" spc="-1" dirty="0" err="1">
+                <a:solidFill>
+                  <a:srgbClr val="1F4E79"/>
+                </a:solidFill>
+                <a:latin typeface="Courier New" panose="02070309020205020404" pitchFamily="49" charset="0"/>
+                <a:cs typeface="Courier New" panose="02070309020205020404" pitchFamily="49" charset="0"/>
+              </a:rPr>
+              <a:t>form-data</a:t>
+            </a:r>
+            <a:r>
+              <a:rPr lang="pt-BR" sz="3200" spc="-1" dirty="0">
+                <a:solidFill>
+                  <a:srgbClr val="1F4E79"/>
+                </a:solidFill>
+                <a:latin typeface="Courier New" panose="02070309020205020404" pitchFamily="49" charset="0"/>
+                <a:cs typeface="Courier New" panose="02070309020205020404" pitchFamily="49" charset="0"/>
+              </a:rPr>
+              <a:t>', </a:t>
+            </a:r>
+            <a:r>
+              <a:rPr lang="pt-BR" sz="3200" spc="-1" dirty="0" err="1">
+                <a:solidFill>
+                  <a:srgbClr val="1F4E79"/>
+                </a:solidFill>
+                <a:latin typeface="Courier New" panose="02070309020205020404" pitchFamily="49" charset="0"/>
+                <a:cs typeface="Courier New" panose="02070309020205020404" pitchFamily="49" charset="0"/>
+              </a:rPr>
+              <a:t>accept</a:t>
+            </a:r>
+            <a:r>
+              <a:rPr lang="pt-BR" sz="3200" spc="-1" dirty="0">
+                <a:solidFill>
+                  <a:srgbClr val="1F4E79"/>
+                </a:solidFill>
+                <a:latin typeface="Courier New" panose="02070309020205020404" pitchFamily="49" charset="0"/>
+                <a:cs typeface="Courier New" panose="02070309020205020404" pitchFamily="49" charset="0"/>
+              </a:rPr>
+              <a:t>: '</a:t>
+            </a:r>
+            <a:r>
+              <a:rPr lang="pt-BR" sz="3200" spc="-1" dirty="0" err="1">
+                <a:solidFill>
+                  <a:srgbClr val="1F4E79"/>
+                </a:solidFill>
+                <a:latin typeface="Courier New" panose="02070309020205020404" pitchFamily="49" charset="0"/>
+                <a:cs typeface="Courier New" panose="02070309020205020404" pitchFamily="49" charset="0"/>
+              </a:rPr>
+              <a:t>application</a:t>
+            </a:r>
+            <a:r>
+              <a:rPr lang="pt-BR" sz="3200" spc="-1" dirty="0">
+                <a:solidFill>
+                  <a:srgbClr val="1F4E79"/>
+                </a:solidFill>
+                <a:latin typeface="Courier New" panose="02070309020205020404" pitchFamily="49" charset="0"/>
+                <a:cs typeface="Courier New" panose="02070309020205020404" pitchFamily="49" charset="0"/>
+              </a:rPr>
+              <a:t>/</a:t>
+            </a:r>
+            <a:r>
+              <a:rPr lang="pt-BR" sz="3200" spc="-1" dirty="0" err="1">
+                <a:solidFill>
+                  <a:srgbClr val="1F4E79"/>
+                </a:solidFill>
+                <a:latin typeface="Courier New" panose="02070309020205020404" pitchFamily="49" charset="0"/>
+                <a:cs typeface="Courier New" panose="02070309020205020404" pitchFamily="49" charset="0"/>
+              </a:rPr>
+              <a:t>json</a:t>
+            </a:r>
+            <a:r>
+              <a:rPr lang="pt-BR" sz="3200" spc="-1" dirty="0">
+                <a:solidFill>
+                  <a:srgbClr val="1F4E79"/>
+                </a:solidFill>
+                <a:latin typeface="Courier New" panose="02070309020205020404" pitchFamily="49" charset="0"/>
+                <a:cs typeface="Courier New" panose="02070309020205020404" pitchFamily="49" charset="0"/>
+              </a:rPr>
+              <a:t>' }</a:t>
+            </a:r>
+          </a:p>
+          <a:p>
+            <a:pPr>
+              <a:lnSpc>
+                <a:spcPct val="100000"/>
+              </a:lnSpc>
+              <a:spcBef>
+                <a:spcPts val="1001"/>
+              </a:spcBef>
+              <a:spcAft>
+                <a:spcPts val="1001"/>
+              </a:spcAft>
+              <a:tabLst>
+                <a:tab pos="0" algn="l"/>
+              </a:tabLst>
+            </a:pPr>
+            <a:r>
+              <a:rPr lang="pt-BR" sz="3200" spc="-1" dirty="0">
+                <a:solidFill>
+                  <a:srgbClr val="1F4E79"/>
+                </a:solidFill>
+                <a:latin typeface="Courier New" panose="02070309020205020404" pitchFamily="49" charset="0"/>
+                <a:cs typeface="Courier New" panose="02070309020205020404" pitchFamily="49" charset="0"/>
+              </a:rPr>
+              <a:t>            </a:t>
+            </a:r>
+            <a:r>
+              <a:rPr lang="pt-BR" sz="3200" spc="-1" dirty="0" err="1">
+                <a:solidFill>
+                  <a:srgbClr val="1F4E79"/>
+                </a:solidFill>
+                <a:latin typeface="Courier New" panose="02070309020205020404" pitchFamily="49" charset="0"/>
+                <a:cs typeface="Courier New" panose="02070309020205020404" pitchFamily="49" charset="0"/>
+              </a:rPr>
+              <a:t>await</a:t>
+            </a:r>
+            <a:r>
+              <a:rPr lang="pt-BR" sz="3200" spc="-1" dirty="0">
+                <a:solidFill>
+                  <a:srgbClr val="1F4E79"/>
+                </a:solidFill>
+                <a:latin typeface="Courier New" panose="02070309020205020404" pitchFamily="49" charset="0"/>
+                <a:cs typeface="Courier New" panose="02070309020205020404" pitchFamily="49" charset="0"/>
+              </a:rPr>
+              <a:t> </a:t>
+            </a:r>
+            <a:r>
+              <a:rPr lang="pt-BR" sz="3200" spc="-1" dirty="0" err="1">
+                <a:solidFill>
+                  <a:srgbClr val="1F4E79"/>
+                </a:solidFill>
+                <a:latin typeface="Courier New" panose="02070309020205020404" pitchFamily="49" charset="0"/>
+                <a:cs typeface="Courier New" panose="02070309020205020404" pitchFamily="49" charset="0"/>
+              </a:rPr>
+              <a:t>api.post</a:t>
+            </a:r>
+            <a:r>
+              <a:rPr lang="pt-BR" sz="3200" spc="-1" dirty="0">
+                <a:solidFill>
+                  <a:srgbClr val="1F4E79"/>
+                </a:solidFill>
+                <a:latin typeface="Courier New" panose="02070309020205020404" pitchFamily="49" charset="0"/>
+                <a:cs typeface="Courier New" panose="02070309020205020404" pitchFamily="49" charset="0"/>
+              </a:rPr>
+              <a:t>(`/</a:t>
+            </a:r>
+            <a:r>
+              <a:rPr lang="pt-BR" sz="3200" spc="-1" dirty="0" err="1">
+                <a:solidFill>
+                  <a:srgbClr val="1F4E79"/>
+                </a:solidFill>
+                <a:latin typeface="Courier New" panose="02070309020205020404" pitchFamily="49" charset="0"/>
+                <a:cs typeface="Courier New" panose="02070309020205020404" pitchFamily="49" charset="0"/>
+              </a:rPr>
+              <a:t>api</a:t>
+            </a:r>
+            <a:r>
+              <a:rPr lang="pt-BR" sz="3200" spc="-1" dirty="0">
+                <a:solidFill>
+                  <a:srgbClr val="1F4E79"/>
+                </a:solidFill>
+                <a:latin typeface="Courier New" panose="02070309020205020404" pitchFamily="49" charset="0"/>
+                <a:cs typeface="Courier New" panose="02070309020205020404" pitchFamily="49" charset="0"/>
+              </a:rPr>
+              <a:t>/upload-</a:t>
+            </a:r>
+            <a:r>
+              <a:rPr lang="pt-BR" sz="3200" spc="-1" dirty="0" err="1">
+                <a:solidFill>
+                  <a:srgbClr val="1F4E79"/>
+                </a:solidFill>
+                <a:latin typeface="Courier New" panose="02070309020205020404" pitchFamily="49" charset="0"/>
+                <a:cs typeface="Courier New" panose="02070309020205020404" pitchFamily="49" charset="0"/>
+              </a:rPr>
+              <a:t>image</a:t>
+            </a:r>
+            <a:r>
+              <a:rPr lang="pt-BR" sz="3200" spc="-1" dirty="0">
+                <a:solidFill>
+                  <a:srgbClr val="1F4E79"/>
+                </a:solidFill>
+                <a:latin typeface="Courier New" panose="02070309020205020404" pitchFamily="49" charset="0"/>
+                <a:cs typeface="Courier New" panose="02070309020205020404" pitchFamily="49" charset="0"/>
+              </a:rPr>
+              <a:t>/item/${id}`, </a:t>
+            </a:r>
+            <a:r>
+              <a:rPr lang="pt-BR" sz="3200" spc="-1" dirty="0" err="1">
+                <a:solidFill>
+                  <a:srgbClr val="1F4E79"/>
+                </a:solidFill>
+                <a:latin typeface="Courier New" panose="02070309020205020404" pitchFamily="49" charset="0"/>
+                <a:cs typeface="Courier New" panose="02070309020205020404" pitchFamily="49" charset="0"/>
+              </a:rPr>
+              <a:t>body</a:t>
+            </a:r>
+            <a:r>
+              <a:rPr lang="pt-BR" sz="3200" spc="-1" dirty="0">
+                <a:solidFill>
+                  <a:srgbClr val="1F4E79"/>
+                </a:solidFill>
+                <a:latin typeface="Courier New" panose="02070309020205020404" pitchFamily="49" charset="0"/>
+                <a:cs typeface="Courier New" panose="02070309020205020404" pitchFamily="49" charset="0"/>
+              </a:rPr>
+              <a:t>, { </a:t>
+            </a:r>
+            <a:r>
+              <a:rPr lang="pt-BR" sz="3200" spc="-1" dirty="0" err="1">
+                <a:solidFill>
+                  <a:srgbClr val="1F4E79"/>
+                </a:solidFill>
+                <a:latin typeface="Courier New" panose="02070309020205020404" pitchFamily="49" charset="0"/>
+                <a:cs typeface="Courier New" panose="02070309020205020404" pitchFamily="49" charset="0"/>
+              </a:rPr>
+              <a:t>headers</a:t>
+            </a:r>
+            <a:r>
+              <a:rPr lang="pt-BR" sz="3200" spc="-1" dirty="0">
+                <a:solidFill>
+                  <a:srgbClr val="1F4E79"/>
+                </a:solidFill>
+                <a:latin typeface="Courier New" panose="02070309020205020404" pitchFamily="49" charset="0"/>
+                <a:cs typeface="Courier New" panose="02070309020205020404" pitchFamily="49" charset="0"/>
+              </a:rPr>
+              <a:t> });</a:t>
+            </a:r>
+          </a:p>
+          <a:p>
+            <a:pPr>
+              <a:lnSpc>
+                <a:spcPct val="100000"/>
+              </a:lnSpc>
+              <a:spcBef>
+                <a:spcPts val="1001"/>
+              </a:spcBef>
+              <a:spcAft>
+                <a:spcPts val="1001"/>
+              </a:spcAft>
+              <a:tabLst>
+                <a:tab pos="0" algn="l"/>
+              </a:tabLst>
+            </a:pPr>
+            <a:r>
+              <a:rPr lang="pt-BR" sz="3200" spc="-1" dirty="0">
+                <a:solidFill>
+                  <a:srgbClr val="1F4E79"/>
+                </a:solidFill>
+                <a:latin typeface="Courier New" panose="02070309020205020404" pitchFamily="49" charset="0"/>
+                <a:cs typeface="Courier New" panose="02070309020205020404" pitchFamily="49" charset="0"/>
+              </a:rPr>
+              <a:t>        } catch (</a:t>
+            </a:r>
+            <a:r>
+              <a:rPr lang="pt-BR" sz="3200" spc="-1" dirty="0" err="1">
+                <a:solidFill>
+                  <a:srgbClr val="1F4E79"/>
+                </a:solidFill>
+                <a:latin typeface="Courier New" panose="02070309020205020404" pitchFamily="49" charset="0"/>
+                <a:cs typeface="Courier New" panose="02070309020205020404" pitchFamily="49" charset="0"/>
+              </a:rPr>
+              <a:t>error</a:t>
+            </a:r>
+            <a:r>
+              <a:rPr lang="pt-BR" sz="3200" spc="-1" dirty="0">
+                <a:solidFill>
+                  <a:srgbClr val="1F4E79"/>
+                </a:solidFill>
+                <a:latin typeface="Courier New" panose="02070309020205020404" pitchFamily="49" charset="0"/>
+                <a:cs typeface="Courier New" panose="02070309020205020404" pitchFamily="49" charset="0"/>
+              </a:rPr>
+              <a:t>) { console.log(</a:t>
+            </a:r>
+            <a:r>
+              <a:rPr lang="pt-BR" sz="3200" spc="-1" dirty="0" err="1">
+                <a:solidFill>
+                  <a:srgbClr val="1F4E79"/>
+                </a:solidFill>
+                <a:latin typeface="Courier New" panose="02070309020205020404" pitchFamily="49" charset="0"/>
+                <a:cs typeface="Courier New" panose="02070309020205020404" pitchFamily="49" charset="0"/>
+              </a:rPr>
+              <a:t>error</a:t>
+            </a:r>
+            <a:r>
+              <a:rPr lang="pt-BR" sz="3200" spc="-1" dirty="0">
+                <a:solidFill>
+                  <a:srgbClr val="1F4E79"/>
+                </a:solidFill>
+                <a:latin typeface="Courier New" panose="02070309020205020404" pitchFamily="49" charset="0"/>
+                <a:cs typeface="Courier New" panose="02070309020205020404" pitchFamily="49" charset="0"/>
+              </a:rPr>
+              <a:t>); }</a:t>
+            </a:r>
+          </a:p>
+          <a:p>
+            <a:pPr>
+              <a:lnSpc>
+                <a:spcPct val="100000"/>
+              </a:lnSpc>
+              <a:spcBef>
+                <a:spcPts val="1001"/>
+              </a:spcBef>
+              <a:spcAft>
+                <a:spcPts val="1001"/>
+              </a:spcAft>
+              <a:tabLst>
+                <a:tab pos="0" algn="l"/>
+              </a:tabLst>
+            </a:pPr>
+            <a:r>
+              <a:rPr lang="pt-BR" sz="3200" spc="-1" dirty="0">
+                <a:solidFill>
+                  <a:srgbClr val="1F4E79"/>
+                </a:solidFill>
+                <a:latin typeface="Courier New" panose="02070309020205020404" pitchFamily="49" charset="0"/>
+                <a:cs typeface="Courier New" panose="02070309020205020404" pitchFamily="49" charset="0"/>
+              </a:rPr>
+              <a:t>}, []);</a:t>
+            </a:r>
+          </a:p>
+        </p:txBody>
+      </p:sp>
+    </p:spTree>
+    <p:extLst>
+      <p:ext uri="{BB962C8B-B14F-4D97-AF65-F5344CB8AC3E}">
+        <p14:creationId xmlns:p14="http://schemas.microsoft.com/office/powerpoint/2010/main" val="2731078449"/>
+      </p:ext>
+    </p:extLst>
+  </p:cSld>
+  <p:clrMapOvr>
+    <a:masterClrMapping/>
+  </p:clrMapOvr>
+</p:sld>
+</file>
+
+<file path=ppt/slides/slide48.xml><?xml version="1.0" encoding="utf-8"?>
+<p:sld xmlns:a="http://schemas.openxmlformats.org/drawingml/2006/main" xmlns:r="http://schemas.openxmlformats.org/officeDocument/2006/relationships" xmlns:p="http://schemas.openxmlformats.org/presentationml/2006/main">
+  <p:cSld>
+    <p:spTree>
+      <p:nvGrpSpPr>
+        <p:cNvPr id="1" name=""/>
+        <p:cNvGrpSpPr/>
+        <p:nvPr/>
+      </p:nvGrpSpPr>
+      <p:grpSpPr>
+        <a:xfrm>
+          <a:off x="0" y="0"/>
+          <a:ext cx="0" cy="0"/>
+          <a:chOff x="0" y="0"/>
+          <a:chExt cx="0" cy="0"/>
+        </a:xfrm>
+      </p:grpSpPr>
+      <p:sp>
+        <p:nvSpPr>
+          <p:cNvPr id="98" name="CustomShape 1"/>
+          <p:cNvSpPr/>
+          <p:nvPr/>
+        </p:nvSpPr>
+        <p:spPr>
+          <a:xfrm>
+            <a:off x="0" y="224280"/>
+            <a:ext cx="12019320" cy="854640"/>
+          </a:xfrm>
+          <a:prstGeom prst="rect">
+            <a:avLst/>
+          </a:prstGeom>
+          <a:noFill/>
+          <a:ln>
+            <a:noFill/>
+          </a:ln>
+        </p:spPr>
+        <p:style>
+          <a:lnRef idx="0">
+            <a:scrgbClr r="0" g="0" b="0"/>
+          </a:lnRef>
+          <a:fillRef idx="0">
+            <a:scrgbClr r="0" g="0" b="0"/>
+          </a:fillRef>
+          <a:effectRef idx="0">
+            <a:scrgbClr r="0" g="0" b="0"/>
+          </a:effectRef>
+          <a:fontRef idx="minor"/>
+        </p:style>
+        <p:txBody>
+          <a:bodyPr lIns="90000" tIns="45000" rIns="90000" bIns="45000" anchor="ctr">
+            <a:noAutofit/>
+          </a:bodyPr>
+          <a:lstStyle/>
+          <a:p>
+            <a:pPr algn="ctr">
+              <a:lnSpc>
+                <a:spcPct val="90000"/>
+              </a:lnSpc>
+            </a:pPr>
+            <a:r>
+              <a:rPr lang="pt-BR" sz="5400" b="0" strike="noStrike" spc="-1" dirty="0">
+                <a:solidFill>
+                  <a:srgbClr val="1F4E79"/>
+                </a:solidFill>
+                <a:latin typeface="Arial"/>
+                <a:ea typeface="DejaVu Sans"/>
+              </a:rPr>
+              <a:t>Upload de arquivos</a:t>
+            </a:r>
+            <a:endParaRPr lang="pt-BR" sz="5400" b="0" strike="noStrike" spc="-1" dirty="0">
+              <a:latin typeface="Arial"/>
+            </a:endParaRPr>
+          </a:p>
+        </p:txBody>
+      </p:sp>
+      <p:sp>
+        <p:nvSpPr>
+          <p:cNvPr id="99" name="CustomShape 2"/>
+          <p:cNvSpPr/>
+          <p:nvPr/>
+        </p:nvSpPr>
+        <p:spPr>
+          <a:xfrm>
+            <a:off x="317520" y="1290960"/>
+            <a:ext cx="11701440" cy="4347360"/>
+          </a:xfrm>
+          <a:prstGeom prst="rect">
+            <a:avLst/>
+          </a:prstGeom>
+          <a:noFill/>
+          <a:ln>
+            <a:noFill/>
+          </a:ln>
+        </p:spPr>
+        <p:style>
+          <a:lnRef idx="0">
+            <a:scrgbClr r="0" g="0" b="0"/>
+          </a:lnRef>
+          <a:fillRef idx="0">
+            <a:scrgbClr r="0" g="0" b="0"/>
+          </a:fillRef>
+          <a:effectRef idx="0">
+            <a:scrgbClr r="0" g="0" b="0"/>
+          </a:effectRef>
+          <a:fontRef idx="minor"/>
+        </p:style>
+        <p:txBody>
+          <a:bodyPr lIns="90000" tIns="45000" rIns="90000" bIns="45000">
+            <a:normAutofit/>
+          </a:bodyPr>
+          <a:lstStyle/>
+          <a:p>
+            <a:pPr algn="ctr">
+              <a:lnSpc>
+                <a:spcPct val="100000"/>
+              </a:lnSpc>
+              <a:spcBef>
+                <a:spcPts val="1001"/>
+              </a:spcBef>
+              <a:spcAft>
+                <a:spcPts val="1001"/>
+              </a:spcAft>
+              <a:tabLst>
+                <a:tab pos="0" algn="l"/>
+              </a:tabLst>
+            </a:pPr>
+            <a:r>
+              <a:rPr lang="pt-BR" sz="3200" spc="-1" dirty="0">
+                <a:solidFill>
+                  <a:srgbClr val="1F4E79"/>
+                </a:solidFill>
+              </a:rPr>
+              <a:t>O código anterior assume a existência do </a:t>
+            </a:r>
+            <a:r>
+              <a:rPr lang="pt-BR" sz="3200" spc="-1" dirty="0" err="1">
+                <a:solidFill>
+                  <a:srgbClr val="1F4E79"/>
+                </a:solidFill>
+              </a:rPr>
+              <a:t>endpoint</a:t>
+            </a:r>
+            <a:r>
+              <a:rPr lang="pt-BR" sz="3200" spc="-1" dirty="0">
+                <a:solidFill>
+                  <a:srgbClr val="1F4E79"/>
+                </a:solidFill>
+              </a:rPr>
+              <a:t> </a:t>
+            </a:r>
+            <a:r>
+              <a:rPr lang="pt-BR" sz="3200" spc="-1" dirty="0">
+                <a:solidFill>
+                  <a:srgbClr val="1F4E79"/>
+                </a:solidFill>
+                <a:latin typeface="Courier New" panose="02070309020205020404" pitchFamily="49" charset="0"/>
+                <a:cs typeface="Courier New" panose="02070309020205020404" pitchFamily="49" charset="0"/>
+              </a:rPr>
+              <a:t>/</a:t>
+            </a:r>
+            <a:r>
+              <a:rPr lang="pt-BR" sz="3200" spc="-1" dirty="0" err="1">
+                <a:solidFill>
+                  <a:srgbClr val="1F4E79"/>
+                </a:solidFill>
+                <a:latin typeface="Courier New" panose="02070309020205020404" pitchFamily="49" charset="0"/>
+                <a:cs typeface="Courier New" panose="02070309020205020404" pitchFamily="49" charset="0"/>
+              </a:rPr>
+              <a:t>api</a:t>
+            </a:r>
+            <a:r>
+              <a:rPr lang="pt-BR" sz="3200" spc="-1" dirty="0">
+                <a:solidFill>
+                  <a:srgbClr val="1F4E79"/>
+                </a:solidFill>
+                <a:latin typeface="Courier New" panose="02070309020205020404" pitchFamily="49" charset="0"/>
+                <a:cs typeface="Courier New" panose="02070309020205020404" pitchFamily="49" charset="0"/>
+              </a:rPr>
+              <a:t>/upload-</a:t>
+            </a:r>
+            <a:r>
+              <a:rPr lang="pt-BR" sz="3200" spc="-1" dirty="0" err="1">
+                <a:solidFill>
+                  <a:srgbClr val="1F4E79"/>
+                </a:solidFill>
+                <a:latin typeface="Courier New" panose="02070309020205020404" pitchFamily="49" charset="0"/>
+                <a:cs typeface="Courier New" panose="02070309020205020404" pitchFamily="49" charset="0"/>
+              </a:rPr>
+              <a:t>image</a:t>
+            </a:r>
+            <a:r>
+              <a:rPr lang="pt-BR" sz="3200" spc="-1" dirty="0">
+                <a:solidFill>
+                  <a:srgbClr val="1F4E79"/>
+                </a:solidFill>
+                <a:latin typeface="Courier New" panose="02070309020205020404" pitchFamily="49" charset="0"/>
+                <a:cs typeface="Courier New" panose="02070309020205020404" pitchFamily="49" charset="0"/>
+              </a:rPr>
+              <a:t>/item/:id</a:t>
+            </a:r>
+            <a:r>
+              <a:rPr lang="pt-BR" sz="3200" spc="-1" dirty="0">
+                <a:solidFill>
+                  <a:srgbClr val="1F4E79"/>
+                </a:solidFill>
+              </a:rPr>
+              <a:t> na API configurada no objeto:</a:t>
+            </a:r>
+          </a:p>
+          <a:p>
+            <a:pPr algn="ctr">
+              <a:lnSpc>
+                <a:spcPct val="100000"/>
+              </a:lnSpc>
+              <a:spcBef>
+                <a:spcPts val="1001"/>
+              </a:spcBef>
+              <a:spcAft>
+                <a:spcPts val="1001"/>
+              </a:spcAft>
+              <a:tabLst>
+                <a:tab pos="0" algn="l"/>
+              </a:tabLst>
+            </a:pPr>
+            <a:r>
+              <a:rPr lang="en-US" sz="3200" spc="-1" dirty="0">
+                <a:solidFill>
+                  <a:srgbClr val="1F4E79"/>
+                </a:solidFill>
+                <a:latin typeface="Courier New" panose="02070309020205020404" pitchFamily="49" charset="0"/>
+                <a:cs typeface="Courier New" panose="02070309020205020404" pitchFamily="49" charset="0"/>
+              </a:rPr>
+              <a:t>import </a:t>
+            </a:r>
+            <a:r>
+              <a:rPr lang="en-US" sz="3200" spc="-1" dirty="0" err="1">
+                <a:solidFill>
+                  <a:srgbClr val="1F4E79"/>
+                </a:solidFill>
+                <a:latin typeface="Courier New" panose="02070309020205020404" pitchFamily="49" charset="0"/>
+                <a:cs typeface="Courier New" panose="02070309020205020404" pitchFamily="49" charset="0"/>
+              </a:rPr>
+              <a:t>api</a:t>
+            </a:r>
+            <a:r>
+              <a:rPr lang="en-US" sz="3200" spc="-1" dirty="0">
+                <a:solidFill>
+                  <a:srgbClr val="1F4E79"/>
+                </a:solidFill>
+                <a:latin typeface="Courier New" panose="02070309020205020404" pitchFamily="49" charset="0"/>
+                <a:cs typeface="Courier New" panose="02070309020205020404" pitchFamily="49" charset="0"/>
+              </a:rPr>
+              <a:t> from '../../services/</a:t>
+            </a:r>
+            <a:r>
+              <a:rPr lang="en-US" sz="3200" spc="-1" dirty="0" err="1">
+                <a:solidFill>
+                  <a:srgbClr val="1F4E79"/>
+                </a:solidFill>
+                <a:latin typeface="Courier New" panose="02070309020205020404" pitchFamily="49" charset="0"/>
+                <a:cs typeface="Courier New" panose="02070309020205020404" pitchFamily="49" charset="0"/>
+              </a:rPr>
+              <a:t>api</a:t>
+            </a:r>
+            <a:r>
+              <a:rPr lang="en-US" sz="3200" spc="-1" dirty="0">
+                <a:solidFill>
+                  <a:srgbClr val="1F4E79"/>
+                </a:solidFill>
+                <a:latin typeface="Courier New" panose="02070309020205020404" pitchFamily="49" charset="0"/>
+                <a:cs typeface="Courier New" panose="02070309020205020404" pitchFamily="49" charset="0"/>
+              </a:rPr>
+              <a:t>';</a:t>
+            </a:r>
+            <a:endParaRPr lang="pt-BR" sz="3200" spc="-1" dirty="0">
+              <a:solidFill>
+                <a:srgbClr val="1F4E79"/>
+              </a:solidFill>
+              <a:latin typeface="Courier New" panose="02070309020205020404" pitchFamily="49" charset="0"/>
+              <a:cs typeface="Courier New" panose="02070309020205020404" pitchFamily="49" charset="0"/>
+            </a:endParaRPr>
+          </a:p>
+        </p:txBody>
+      </p:sp>
+    </p:spTree>
+    <p:extLst>
+      <p:ext uri="{BB962C8B-B14F-4D97-AF65-F5344CB8AC3E}">
+        <p14:creationId xmlns:p14="http://schemas.microsoft.com/office/powerpoint/2010/main" val="1319269195"/>
+      </p:ext>
+    </p:extLst>
+  </p:cSld>
+  <p:clrMapOvr>
+    <a:masterClrMapping/>
+  </p:clrMapOvr>
+</p:sld>
+</file>
+
+<file path=ppt/slides/slide49.xml><?xml version="1.0" encoding="utf-8"?>
 <p:sld xmlns:a="http://schemas.openxmlformats.org/drawingml/2006/main" xmlns:r="http://schemas.openxmlformats.org/officeDocument/2006/relationships" xmlns:p="http://schemas.openxmlformats.org/presentationml/2006/main">
   <p:cSld>
     <p:spTree>

</xml_diff>